<commit_message>
update the section 3 of the BESS document.
</commit_message>
<xml_diff>
--- a/2_SystemDesign_Doc/5_Energy_Storage_System_Design_Img/designDoc.pptx
+++ b/2_SystemDesign_Doc/5_Energy_Storage_System_Design_Img/designDoc.pptx
@@ -4,9 +4,14 @@
   <p:sldMasterIdLst>
     <p:sldMasterId id="2147483648" r:id="rId1"/>
   </p:sldMasterIdLst>
+  <p:notesMasterIdLst>
+    <p:notesMasterId r:id="rId6"/>
+  </p:notesMasterIdLst>
   <p:sldIdLst>
     <p:sldId id="256" r:id="rId2"/>
     <p:sldId id="257" r:id="rId3"/>
+    <p:sldId id="258" r:id="rId4"/>
+    <p:sldId id="259" r:id="rId5"/>
   </p:sldIdLst>
   <p:sldSz cx="12192000" cy="6858000"/>
   <p:notesSz cx="6858000" cy="9144000"/>
@@ -113,6 +118,440 @@
 </p:presentation>
 </file>
 
+<file path=ppt/notesMasters/notesMaster1.xml><?xml version="1.0" encoding="utf-8"?>
+<p:notesMaster xmlns:a="http://schemas.openxmlformats.org/drawingml/2006/main" xmlns:r="http://schemas.openxmlformats.org/officeDocument/2006/relationships" xmlns:p="http://schemas.openxmlformats.org/presentationml/2006/main">
+  <p:cSld>
+    <p:bg>
+      <p:bgRef idx="1001">
+        <a:schemeClr val="bg1"/>
+      </p:bgRef>
+    </p:bg>
+    <p:spTree>
+      <p:nvGrpSpPr>
+        <p:cNvPr id="1" name=""/>
+        <p:cNvGrpSpPr/>
+        <p:nvPr/>
+      </p:nvGrpSpPr>
+      <p:grpSpPr>
+        <a:xfrm>
+          <a:off x="0" y="0"/>
+          <a:ext cx="0" cy="0"/>
+          <a:chOff x="0" y="0"/>
+          <a:chExt cx="0" cy="0"/>
+        </a:xfrm>
+      </p:grpSpPr>
+      <p:sp>
+        <p:nvSpPr>
+          <p:cNvPr id="2" name="Header Placeholder 1"/>
+          <p:cNvSpPr>
+            <a:spLocks noGrp="1"/>
+          </p:cNvSpPr>
+          <p:nvPr>
+            <p:ph type="hdr" sz="quarter"/>
+          </p:nvPr>
+        </p:nvSpPr>
+        <p:spPr>
+          <a:xfrm>
+            <a:off x="0" y="0"/>
+            <a:ext cx="2971800" cy="458788"/>
+          </a:xfrm>
+          <a:prstGeom prst="rect">
+            <a:avLst/>
+          </a:prstGeom>
+        </p:spPr>
+        <p:txBody>
+          <a:bodyPr vert="horz" lIns="91440" tIns="45720" rIns="91440" bIns="45720" rtlCol="0"/>
+          <a:lstStyle>
+            <a:lvl1pPr algn="l">
+              <a:defRPr sz="1200"/>
+            </a:lvl1pPr>
+          </a:lstStyle>
+          <a:p>
+            <a:endParaRPr lang="en-SG"/>
+          </a:p>
+        </p:txBody>
+      </p:sp>
+      <p:sp>
+        <p:nvSpPr>
+          <p:cNvPr id="3" name="Date Placeholder 2"/>
+          <p:cNvSpPr>
+            <a:spLocks noGrp="1"/>
+          </p:cNvSpPr>
+          <p:nvPr>
+            <p:ph type="dt" idx="1"/>
+          </p:nvPr>
+        </p:nvSpPr>
+        <p:spPr>
+          <a:xfrm>
+            <a:off x="3884613" y="0"/>
+            <a:ext cx="2971800" cy="458788"/>
+          </a:xfrm>
+          <a:prstGeom prst="rect">
+            <a:avLst/>
+          </a:prstGeom>
+        </p:spPr>
+        <p:txBody>
+          <a:bodyPr vert="horz" lIns="91440" tIns="45720" rIns="91440" bIns="45720" rtlCol="0"/>
+          <a:lstStyle>
+            <a:lvl1pPr algn="r">
+              <a:defRPr sz="1200"/>
+            </a:lvl1pPr>
+          </a:lstStyle>
+          <a:p>
+            <a:fld id="{F611CB68-FF1F-4DE3-964A-E6F854C1536F}" type="datetimeFigureOut">
+              <a:rPr lang="en-SG" smtClean="0"/>
+              <a:t>9/10/2025</a:t>
+            </a:fld>
+            <a:endParaRPr lang="en-SG"/>
+          </a:p>
+        </p:txBody>
+      </p:sp>
+      <p:sp>
+        <p:nvSpPr>
+          <p:cNvPr id="4" name="Slide Image Placeholder 3"/>
+          <p:cNvSpPr>
+            <a:spLocks noGrp="1" noRot="1" noChangeAspect="1"/>
+          </p:cNvSpPr>
+          <p:nvPr>
+            <p:ph type="sldImg" idx="2"/>
+          </p:nvPr>
+        </p:nvSpPr>
+        <p:spPr>
+          <a:xfrm>
+            <a:off x="685800" y="1143000"/>
+            <a:ext cx="5486400" cy="3086100"/>
+          </a:xfrm>
+          <a:prstGeom prst="rect">
+            <a:avLst/>
+          </a:prstGeom>
+          <a:noFill/>
+          <a:ln w="12700">
+            <a:solidFill>
+              <a:prstClr val="black"/>
+            </a:solidFill>
+          </a:ln>
+        </p:spPr>
+        <p:txBody>
+          <a:bodyPr vert="horz" lIns="91440" tIns="45720" rIns="91440" bIns="45720" rtlCol="0" anchor="ctr"/>
+          <a:lstStyle/>
+          <a:p>
+            <a:endParaRPr lang="en-SG"/>
+          </a:p>
+        </p:txBody>
+      </p:sp>
+      <p:sp>
+        <p:nvSpPr>
+          <p:cNvPr id="5" name="Notes Placeholder 4"/>
+          <p:cNvSpPr>
+            <a:spLocks noGrp="1"/>
+          </p:cNvSpPr>
+          <p:nvPr>
+            <p:ph type="body" sz="quarter" idx="3"/>
+          </p:nvPr>
+        </p:nvSpPr>
+        <p:spPr>
+          <a:xfrm>
+            <a:off x="685800" y="4400550"/>
+            <a:ext cx="5486400" cy="3600450"/>
+          </a:xfrm>
+          <a:prstGeom prst="rect">
+            <a:avLst/>
+          </a:prstGeom>
+        </p:spPr>
+        <p:txBody>
+          <a:bodyPr vert="horz" lIns="91440" tIns="45720" rIns="91440" bIns="45720" rtlCol="0"/>
+          <a:lstStyle/>
+          <a:p>
+            <a:pPr lvl="0"/>
+            <a:r>
+              <a:rPr lang="en-US"/>
+              <a:t>Click to edit Master text styles</a:t>
+            </a:r>
+          </a:p>
+          <a:p>
+            <a:pPr lvl="1"/>
+            <a:r>
+              <a:rPr lang="en-US"/>
+              <a:t>Second level</a:t>
+            </a:r>
+          </a:p>
+          <a:p>
+            <a:pPr lvl="2"/>
+            <a:r>
+              <a:rPr lang="en-US"/>
+              <a:t>Third level</a:t>
+            </a:r>
+          </a:p>
+          <a:p>
+            <a:pPr lvl="3"/>
+            <a:r>
+              <a:rPr lang="en-US"/>
+              <a:t>Fourth level</a:t>
+            </a:r>
+          </a:p>
+          <a:p>
+            <a:pPr lvl="4"/>
+            <a:r>
+              <a:rPr lang="en-US"/>
+              <a:t>Fifth level</a:t>
+            </a:r>
+            <a:endParaRPr lang="en-SG"/>
+          </a:p>
+        </p:txBody>
+      </p:sp>
+      <p:sp>
+        <p:nvSpPr>
+          <p:cNvPr id="6" name="Footer Placeholder 5"/>
+          <p:cNvSpPr>
+            <a:spLocks noGrp="1"/>
+          </p:cNvSpPr>
+          <p:nvPr>
+            <p:ph type="ftr" sz="quarter" idx="4"/>
+          </p:nvPr>
+        </p:nvSpPr>
+        <p:spPr>
+          <a:xfrm>
+            <a:off x="0" y="8685213"/>
+            <a:ext cx="2971800" cy="458787"/>
+          </a:xfrm>
+          <a:prstGeom prst="rect">
+            <a:avLst/>
+          </a:prstGeom>
+        </p:spPr>
+        <p:txBody>
+          <a:bodyPr vert="horz" lIns="91440" tIns="45720" rIns="91440" bIns="45720" rtlCol="0" anchor="b"/>
+          <a:lstStyle>
+            <a:lvl1pPr algn="l">
+              <a:defRPr sz="1200"/>
+            </a:lvl1pPr>
+          </a:lstStyle>
+          <a:p>
+            <a:endParaRPr lang="en-SG"/>
+          </a:p>
+        </p:txBody>
+      </p:sp>
+      <p:sp>
+        <p:nvSpPr>
+          <p:cNvPr id="7" name="Slide Number Placeholder 6"/>
+          <p:cNvSpPr>
+            <a:spLocks noGrp="1"/>
+          </p:cNvSpPr>
+          <p:nvPr>
+            <p:ph type="sldNum" sz="quarter" idx="5"/>
+          </p:nvPr>
+        </p:nvSpPr>
+        <p:spPr>
+          <a:xfrm>
+            <a:off x="3884613" y="8685213"/>
+            <a:ext cx="2971800" cy="458787"/>
+          </a:xfrm>
+          <a:prstGeom prst="rect">
+            <a:avLst/>
+          </a:prstGeom>
+        </p:spPr>
+        <p:txBody>
+          <a:bodyPr vert="horz" lIns="91440" tIns="45720" rIns="91440" bIns="45720" rtlCol="0" anchor="b"/>
+          <a:lstStyle>
+            <a:lvl1pPr algn="r">
+              <a:defRPr sz="1200"/>
+            </a:lvl1pPr>
+          </a:lstStyle>
+          <a:p>
+            <a:fld id="{ADA0C084-7545-4A36-8FF9-FF4F14605879}" type="slidenum">
+              <a:rPr lang="en-SG" smtClean="0"/>
+              <a:t>‹#›</a:t>
+            </a:fld>
+            <a:endParaRPr lang="en-SG"/>
+          </a:p>
+        </p:txBody>
+      </p:sp>
+    </p:spTree>
+    <p:extLst>
+      <p:ext uri="{BB962C8B-B14F-4D97-AF65-F5344CB8AC3E}">
+        <p14:creationId xmlns:p14="http://schemas.microsoft.com/office/powerpoint/2010/main" val="1069194598"/>
+      </p:ext>
+    </p:extLst>
+  </p:cSld>
+  <p:clrMap bg1="lt1" tx1="dk1" bg2="lt2" tx2="dk2" accent1="accent1" accent2="accent2" accent3="accent3" accent4="accent4" accent5="accent5" accent6="accent6" hlink="hlink" folHlink="folHlink"/>
+  <p:notesStyle>
+    <a:lvl1pPr marL="0" algn="l" defTabSz="914400" rtl="0" eaLnBrk="1" latinLnBrk="0" hangingPunct="1">
+      <a:defRPr sz="1200" kern="1200">
+        <a:solidFill>
+          <a:schemeClr val="tx1"/>
+        </a:solidFill>
+        <a:latin typeface="+mn-lt"/>
+        <a:ea typeface="+mn-ea"/>
+        <a:cs typeface="+mn-cs"/>
+      </a:defRPr>
+    </a:lvl1pPr>
+    <a:lvl2pPr marL="457200" algn="l" defTabSz="914400" rtl="0" eaLnBrk="1" latinLnBrk="0" hangingPunct="1">
+      <a:defRPr sz="1200" kern="1200">
+        <a:solidFill>
+          <a:schemeClr val="tx1"/>
+        </a:solidFill>
+        <a:latin typeface="+mn-lt"/>
+        <a:ea typeface="+mn-ea"/>
+        <a:cs typeface="+mn-cs"/>
+      </a:defRPr>
+    </a:lvl2pPr>
+    <a:lvl3pPr marL="914400" algn="l" defTabSz="914400" rtl="0" eaLnBrk="1" latinLnBrk="0" hangingPunct="1">
+      <a:defRPr sz="1200" kern="1200">
+        <a:solidFill>
+          <a:schemeClr val="tx1"/>
+        </a:solidFill>
+        <a:latin typeface="+mn-lt"/>
+        <a:ea typeface="+mn-ea"/>
+        <a:cs typeface="+mn-cs"/>
+      </a:defRPr>
+    </a:lvl3pPr>
+    <a:lvl4pPr marL="1371600" algn="l" defTabSz="914400" rtl="0" eaLnBrk="1" latinLnBrk="0" hangingPunct="1">
+      <a:defRPr sz="1200" kern="1200">
+        <a:solidFill>
+          <a:schemeClr val="tx1"/>
+        </a:solidFill>
+        <a:latin typeface="+mn-lt"/>
+        <a:ea typeface="+mn-ea"/>
+        <a:cs typeface="+mn-cs"/>
+      </a:defRPr>
+    </a:lvl4pPr>
+    <a:lvl5pPr marL="1828800" algn="l" defTabSz="914400" rtl="0" eaLnBrk="1" latinLnBrk="0" hangingPunct="1">
+      <a:defRPr sz="1200" kern="1200">
+        <a:solidFill>
+          <a:schemeClr val="tx1"/>
+        </a:solidFill>
+        <a:latin typeface="+mn-lt"/>
+        <a:ea typeface="+mn-ea"/>
+        <a:cs typeface="+mn-cs"/>
+      </a:defRPr>
+    </a:lvl5pPr>
+    <a:lvl6pPr marL="2286000" algn="l" defTabSz="914400" rtl="0" eaLnBrk="1" latinLnBrk="0" hangingPunct="1">
+      <a:defRPr sz="1200" kern="1200">
+        <a:solidFill>
+          <a:schemeClr val="tx1"/>
+        </a:solidFill>
+        <a:latin typeface="+mn-lt"/>
+        <a:ea typeface="+mn-ea"/>
+        <a:cs typeface="+mn-cs"/>
+      </a:defRPr>
+    </a:lvl6pPr>
+    <a:lvl7pPr marL="2743200" algn="l" defTabSz="914400" rtl="0" eaLnBrk="1" latinLnBrk="0" hangingPunct="1">
+      <a:defRPr sz="1200" kern="1200">
+        <a:solidFill>
+          <a:schemeClr val="tx1"/>
+        </a:solidFill>
+        <a:latin typeface="+mn-lt"/>
+        <a:ea typeface="+mn-ea"/>
+        <a:cs typeface="+mn-cs"/>
+      </a:defRPr>
+    </a:lvl7pPr>
+    <a:lvl8pPr marL="3200400" algn="l" defTabSz="914400" rtl="0" eaLnBrk="1" latinLnBrk="0" hangingPunct="1">
+      <a:defRPr sz="1200" kern="1200">
+        <a:solidFill>
+          <a:schemeClr val="tx1"/>
+        </a:solidFill>
+        <a:latin typeface="+mn-lt"/>
+        <a:ea typeface="+mn-ea"/>
+        <a:cs typeface="+mn-cs"/>
+      </a:defRPr>
+    </a:lvl8pPr>
+    <a:lvl9pPr marL="3657600" algn="l" defTabSz="914400" rtl="0" eaLnBrk="1" latinLnBrk="0" hangingPunct="1">
+      <a:defRPr sz="1200" kern="1200">
+        <a:solidFill>
+          <a:schemeClr val="tx1"/>
+        </a:solidFill>
+        <a:latin typeface="+mn-lt"/>
+        <a:ea typeface="+mn-ea"/>
+        <a:cs typeface="+mn-cs"/>
+      </a:defRPr>
+    </a:lvl9pPr>
+  </p:notesStyle>
+</p:notesMaster>
+</file>
+
+<file path=ppt/notesSlides/notesSlide1.xml><?xml version="1.0" encoding="utf-8"?>
+<p:notes xmlns:a="http://schemas.openxmlformats.org/drawingml/2006/main" xmlns:r="http://schemas.openxmlformats.org/officeDocument/2006/relationships" xmlns:p="http://schemas.openxmlformats.org/presentationml/2006/main">
+  <p:cSld>
+    <p:spTree>
+      <p:nvGrpSpPr>
+        <p:cNvPr id="1" name=""/>
+        <p:cNvGrpSpPr/>
+        <p:nvPr/>
+      </p:nvGrpSpPr>
+      <p:grpSpPr>
+        <a:xfrm>
+          <a:off x="0" y="0"/>
+          <a:ext cx="0" cy="0"/>
+          <a:chOff x="0" y="0"/>
+          <a:chExt cx="0" cy="0"/>
+        </a:xfrm>
+      </p:grpSpPr>
+      <p:sp>
+        <p:nvSpPr>
+          <p:cNvPr id="2" name="Slide Image Placeholder 1"/>
+          <p:cNvSpPr>
+            <a:spLocks noGrp="1" noRot="1" noChangeAspect="1"/>
+          </p:cNvSpPr>
+          <p:nvPr>
+            <p:ph type="sldImg"/>
+          </p:nvPr>
+        </p:nvSpPr>
+        <p:spPr/>
+      </p:sp>
+      <p:sp>
+        <p:nvSpPr>
+          <p:cNvPr id="3" name="Notes Placeholder 2"/>
+          <p:cNvSpPr>
+            <a:spLocks noGrp="1"/>
+          </p:cNvSpPr>
+          <p:nvPr>
+            <p:ph type="body" idx="1"/>
+          </p:nvPr>
+        </p:nvSpPr>
+        <p:spPr/>
+        <p:txBody>
+          <a:bodyPr/>
+          <a:lstStyle/>
+          <a:p>
+            <a:endParaRPr lang="en-SG" dirty="0"/>
+          </a:p>
+        </p:txBody>
+      </p:sp>
+      <p:sp>
+        <p:nvSpPr>
+          <p:cNvPr id="4" name="Slide Number Placeholder 3"/>
+          <p:cNvSpPr>
+            <a:spLocks noGrp="1"/>
+          </p:cNvSpPr>
+          <p:nvPr>
+            <p:ph type="sldNum" sz="quarter" idx="5"/>
+          </p:nvPr>
+        </p:nvSpPr>
+        <p:spPr/>
+        <p:txBody>
+          <a:bodyPr/>
+          <a:lstStyle/>
+          <a:p>
+            <a:fld id="{ADA0C084-7545-4A36-8FF9-FF4F14605879}" type="slidenum">
+              <a:rPr lang="en-SG" smtClean="0"/>
+              <a:t>3</a:t>
+            </a:fld>
+            <a:endParaRPr lang="en-SG"/>
+          </a:p>
+        </p:txBody>
+      </p:sp>
+    </p:spTree>
+    <p:extLst>
+      <p:ext uri="{BB962C8B-B14F-4D97-AF65-F5344CB8AC3E}">
+        <p14:creationId xmlns:p14="http://schemas.microsoft.com/office/powerpoint/2010/main" val="2058433886"/>
+      </p:ext>
+    </p:extLst>
+  </p:cSld>
+  <p:clrMapOvr>
+    <a:masterClrMapping/>
+  </p:clrMapOvr>
+</p:notes>
+</file>
+
 <file path=ppt/slideLayouts/slideLayout1.xml><?xml version="1.0" encoding="utf-8"?>
 <p:sldLayout xmlns:a="http://schemas.openxmlformats.org/drawingml/2006/main" xmlns:r="http://schemas.openxmlformats.org/officeDocument/2006/relationships" xmlns:p="http://schemas.openxmlformats.org/presentationml/2006/main" type="title" preserve="1">
   <p:cSld name="Title Slide">
@@ -262,7 +701,7 @@
           <a:p>
             <a:fld id="{459EF112-4185-4C7F-9975-870A6EBFD383}" type="datetimeFigureOut">
               <a:rPr lang="en-SG" smtClean="0"/>
-              <a:t>8/10/2025</a:t>
+              <a:t>9/10/2025</a:t>
             </a:fld>
             <a:endParaRPr lang="en-SG"/>
           </a:p>
@@ -462,7 +901,7 @@
           <a:p>
             <a:fld id="{459EF112-4185-4C7F-9975-870A6EBFD383}" type="datetimeFigureOut">
               <a:rPr lang="en-SG" smtClean="0"/>
-              <a:t>8/10/2025</a:t>
+              <a:t>9/10/2025</a:t>
             </a:fld>
             <a:endParaRPr lang="en-SG"/>
           </a:p>
@@ -672,7 +1111,7 @@
           <a:p>
             <a:fld id="{459EF112-4185-4C7F-9975-870A6EBFD383}" type="datetimeFigureOut">
               <a:rPr lang="en-SG" smtClean="0"/>
-              <a:t>8/10/2025</a:t>
+              <a:t>9/10/2025</a:t>
             </a:fld>
             <a:endParaRPr lang="en-SG"/>
           </a:p>
@@ -872,7 +1311,7 @@
           <a:p>
             <a:fld id="{459EF112-4185-4C7F-9975-870A6EBFD383}" type="datetimeFigureOut">
               <a:rPr lang="en-SG" smtClean="0"/>
-              <a:t>8/10/2025</a:t>
+              <a:t>9/10/2025</a:t>
             </a:fld>
             <a:endParaRPr lang="en-SG"/>
           </a:p>
@@ -1148,7 +1587,7 @@
           <a:p>
             <a:fld id="{459EF112-4185-4C7F-9975-870A6EBFD383}" type="datetimeFigureOut">
               <a:rPr lang="en-SG" smtClean="0"/>
-              <a:t>8/10/2025</a:t>
+              <a:t>9/10/2025</a:t>
             </a:fld>
             <a:endParaRPr lang="en-SG"/>
           </a:p>
@@ -1416,7 +1855,7 @@
           <a:p>
             <a:fld id="{459EF112-4185-4C7F-9975-870A6EBFD383}" type="datetimeFigureOut">
               <a:rPr lang="en-SG" smtClean="0"/>
-              <a:t>8/10/2025</a:t>
+              <a:t>9/10/2025</a:t>
             </a:fld>
             <a:endParaRPr lang="en-SG"/>
           </a:p>
@@ -1831,7 +2270,7 @@
           <a:p>
             <a:fld id="{459EF112-4185-4C7F-9975-870A6EBFD383}" type="datetimeFigureOut">
               <a:rPr lang="en-SG" smtClean="0"/>
-              <a:t>8/10/2025</a:t>
+              <a:t>9/10/2025</a:t>
             </a:fld>
             <a:endParaRPr lang="en-SG"/>
           </a:p>
@@ -1973,7 +2412,7 @@
           <a:p>
             <a:fld id="{459EF112-4185-4C7F-9975-870A6EBFD383}" type="datetimeFigureOut">
               <a:rPr lang="en-SG" smtClean="0"/>
-              <a:t>8/10/2025</a:t>
+              <a:t>9/10/2025</a:t>
             </a:fld>
             <a:endParaRPr lang="en-SG"/>
           </a:p>
@@ -2086,7 +2525,7 @@
           <a:p>
             <a:fld id="{459EF112-4185-4C7F-9975-870A6EBFD383}" type="datetimeFigureOut">
               <a:rPr lang="en-SG" smtClean="0"/>
-              <a:t>8/10/2025</a:t>
+              <a:t>9/10/2025</a:t>
             </a:fld>
             <a:endParaRPr lang="en-SG"/>
           </a:p>
@@ -2399,7 +2838,7 @@
           <a:p>
             <a:fld id="{459EF112-4185-4C7F-9975-870A6EBFD383}" type="datetimeFigureOut">
               <a:rPr lang="en-SG" smtClean="0"/>
-              <a:t>8/10/2025</a:t>
+              <a:t>9/10/2025</a:t>
             </a:fld>
             <a:endParaRPr lang="en-SG"/>
           </a:p>
@@ -2688,7 +3127,7 @@
           <a:p>
             <a:fld id="{459EF112-4185-4C7F-9975-870A6EBFD383}" type="datetimeFigureOut">
               <a:rPr lang="en-SG" smtClean="0"/>
-              <a:t>8/10/2025</a:t>
+              <a:t>9/10/2025</a:t>
             </a:fld>
             <a:endParaRPr lang="en-SG"/>
           </a:p>
@@ -2931,7 +3370,7 @@
           <a:p>
             <a:fld id="{459EF112-4185-4C7F-9975-870A6EBFD383}" type="datetimeFigureOut">
               <a:rPr lang="en-SG" smtClean="0"/>
-              <a:t>8/10/2025</a:t>
+              <a:t>9/10/2025</a:t>
             </a:fld>
             <a:endParaRPr lang="en-SG"/>
           </a:p>
@@ -4070,10 +4509,1237 @@
           </a:prstGeom>
         </p:spPr>
       </p:pic>
+      <p:pic>
+        <p:nvPicPr>
+          <p:cNvPr id="2" name="Picture 1">
+            <a:extLst>
+              <a:ext uri="{FF2B5EF4-FFF2-40B4-BE49-F238E27FC236}">
+                <a16:creationId xmlns:a16="http://schemas.microsoft.com/office/drawing/2014/main" id="{436765FE-9478-5887-F9A8-E9A1CDD6141D}"/>
+              </a:ext>
+            </a:extLst>
+          </p:cNvPr>
+          <p:cNvPicPr>
+            <a:picLocks noChangeAspect="1"/>
+          </p:cNvPicPr>
+          <p:nvPr/>
+        </p:nvPicPr>
+        <p:blipFill>
+          <a:blip r:embed="rId4"/>
+          <a:stretch>
+            <a:fillRect/>
+          </a:stretch>
+        </p:blipFill>
+        <p:spPr>
+          <a:xfrm>
+            <a:off x="722376" y="712929"/>
+            <a:ext cx="9927600" cy="4719679"/>
+          </a:xfrm>
+          <a:prstGeom prst="rect">
+            <a:avLst/>
+          </a:prstGeom>
+        </p:spPr>
+      </p:pic>
     </p:spTree>
     <p:extLst>
       <p:ext uri="{BB962C8B-B14F-4D97-AF65-F5344CB8AC3E}">
         <p14:creationId xmlns:p14="http://schemas.microsoft.com/office/powerpoint/2010/main" val="3135892749"/>
+      </p:ext>
+    </p:extLst>
+  </p:cSld>
+  <p:clrMapOvr>
+    <a:masterClrMapping/>
+  </p:clrMapOvr>
+</p:sld>
+</file>
+
+<file path=ppt/slides/slide3.xml><?xml version="1.0" encoding="utf-8"?>
+<p:sld xmlns:a="http://schemas.openxmlformats.org/drawingml/2006/main" xmlns:r="http://schemas.openxmlformats.org/officeDocument/2006/relationships" xmlns:p="http://schemas.openxmlformats.org/presentationml/2006/main">
+  <p:cSld>
+    <p:spTree>
+      <p:nvGrpSpPr>
+        <p:cNvPr id="1" name=""/>
+        <p:cNvGrpSpPr/>
+        <p:nvPr/>
+      </p:nvGrpSpPr>
+      <p:grpSpPr>
+        <a:xfrm>
+          <a:off x="0" y="0"/>
+          <a:ext cx="0" cy="0"/>
+          <a:chOff x="0" y="0"/>
+          <a:chExt cx="0" cy="0"/>
+        </a:xfrm>
+      </p:grpSpPr>
+      <p:pic>
+        <p:nvPicPr>
+          <p:cNvPr id="5" name="Picture 4">
+            <a:extLst>
+              <a:ext uri="{FF2B5EF4-FFF2-40B4-BE49-F238E27FC236}">
+                <a16:creationId xmlns:a16="http://schemas.microsoft.com/office/drawing/2014/main" id="{779406AA-CC4D-F6D2-7186-4B0776A04E90}"/>
+              </a:ext>
+            </a:extLst>
+          </p:cNvPr>
+          <p:cNvPicPr>
+            <a:picLocks noChangeAspect="1"/>
+          </p:cNvPicPr>
+          <p:nvPr/>
+        </p:nvPicPr>
+        <p:blipFill>
+          <a:blip r:embed="rId3"/>
+          <a:stretch>
+            <a:fillRect/>
+          </a:stretch>
+        </p:blipFill>
+        <p:spPr>
+          <a:xfrm>
+            <a:off x="346509" y="384208"/>
+            <a:ext cx="11329457" cy="6089583"/>
+          </a:xfrm>
+          <a:prstGeom prst="rect">
+            <a:avLst/>
+          </a:prstGeom>
+        </p:spPr>
+      </p:pic>
+      <p:sp>
+        <p:nvSpPr>
+          <p:cNvPr id="12" name="Freeform: Shape 11">
+            <a:extLst>
+              <a:ext uri="{FF2B5EF4-FFF2-40B4-BE49-F238E27FC236}">
+                <a16:creationId xmlns:a16="http://schemas.microsoft.com/office/drawing/2014/main" id="{7A9B300A-FF95-31E5-E6BE-701C608C27F9}"/>
+              </a:ext>
+            </a:extLst>
+          </p:cNvPr>
+          <p:cNvSpPr/>
+          <p:nvPr/>
+        </p:nvSpPr>
+        <p:spPr>
+          <a:xfrm>
+            <a:off x="137160" y="256032"/>
+            <a:ext cx="11832336" cy="6318504"/>
+          </a:xfrm>
+          <a:custGeom>
+            <a:avLst/>
+            <a:gdLst>
+              <a:gd name="connsiteX0" fmla="*/ 4200148 w 11832336"/>
+              <a:gd name="connsiteY0" fmla="*/ 4114800 h 6318504"/>
+              <a:gd name="connsiteX1" fmla="*/ 4023360 w 11832336"/>
+              <a:gd name="connsiteY1" fmla="*/ 4291588 h 6318504"/>
+              <a:gd name="connsiteX2" fmla="*/ 4023360 w 11832336"/>
+              <a:gd name="connsiteY2" fmla="*/ 5830820 h 6318504"/>
+              <a:gd name="connsiteX3" fmla="*/ 4200148 w 11832336"/>
+              <a:gd name="connsiteY3" fmla="*/ 6007608 h 6318504"/>
+              <a:gd name="connsiteX4" fmla="*/ 4907277 w 11832336"/>
+              <a:gd name="connsiteY4" fmla="*/ 6007608 h 6318504"/>
+              <a:gd name="connsiteX5" fmla="*/ 5084064 w 11832336"/>
+              <a:gd name="connsiteY5" fmla="*/ 5830820 h 6318504"/>
+              <a:gd name="connsiteX6" fmla="*/ 5084064 w 11832336"/>
+              <a:gd name="connsiteY6" fmla="*/ 4291588 h 6318504"/>
+              <a:gd name="connsiteX7" fmla="*/ 4907277 w 11832336"/>
+              <a:gd name="connsiteY7" fmla="*/ 4114800 h 6318504"/>
+              <a:gd name="connsiteX8" fmla="*/ 5442717 w 11832336"/>
+              <a:gd name="connsiteY8" fmla="*/ 2465832 h 6318504"/>
+              <a:gd name="connsiteX9" fmla="*/ 5184648 w 11832336"/>
+              <a:gd name="connsiteY9" fmla="*/ 2723901 h 6318504"/>
+              <a:gd name="connsiteX10" fmla="*/ 5184648 w 11832336"/>
+              <a:gd name="connsiteY10" fmla="*/ 4286499 h 6318504"/>
+              <a:gd name="connsiteX11" fmla="*/ 5442717 w 11832336"/>
+              <a:gd name="connsiteY11" fmla="*/ 4544568 h 6318504"/>
+              <a:gd name="connsiteX12" fmla="*/ 6474965 w 11832336"/>
+              <a:gd name="connsiteY12" fmla="*/ 4544568 h 6318504"/>
+              <a:gd name="connsiteX13" fmla="*/ 6733034 w 11832336"/>
+              <a:gd name="connsiteY13" fmla="*/ 4286499 h 6318504"/>
+              <a:gd name="connsiteX14" fmla="*/ 6733034 w 11832336"/>
+              <a:gd name="connsiteY14" fmla="*/ 2723901 h 6318504"/>
+              <a:gd name="connsiteX15" fmla="*/ 6474965 w 11832336"/>
+              <a:gd name="connsiteY15" fmla="*/ 2465832 h 6318504"/>
+              <a:gd name="connsiteX16" fmla="*/ 1475237 w 11832336"/>
+              <a:gd name="connsiteY16" fmla="*/ 2139696 h 6318504"/>
+              <a:gd name="connsiteX17" fmla="*/ 1207008 w 11832336"/>
+              <a:gd name="connsiteY17" fmla="*/ 2407925 h 6318504"/>
+              <a:gd name="connsiteX18" fmla="*/ 1207008 w 11832336"/>
+              <a:gd name="connsiteY18" fmla="*/ 3480811 h 6318504"/>
+              <a:gd name="connsiteX19" fmla="*/ 1475237 w 11832336"/>
+              <a:gd name="connsiteY19" fmla="*/ 3749040 h 6318504"/>
+              <a:gd name="connsiteX20" fmla="*/ 2913883 w 11832336"/>
+              <a:gd name="connsiteY20" fmla="*/ 3749040 h 6318504"/>
+              <a:gd name="connsiteX21" fmla="*/ 3182112 w 11832336"/>
+              <a:gd name="connsiteY21" fmla="*/ 3480811 h 6318504"/>
+              <a:gd name="connsiteX22" fmla="*/ 3182112 w 11832336"/>
+              <a:gd name="connsiteY22" fmla="*/ 2407925 h 6318504"/>
+              <a:gd name="connsiteX23" fmla="*/ 2913883 w 11832336"/>
+              <a:gd name="connsiteY23" fmla="*/ 2139696 h 6318504"/>
+              <a:gd name="connsiteX24" fmla="*/ 0 w 11832336"/>
+              <a:gd name="connsiteY24" fmla="*/ 0 h 6318504"/>
+              <a:gd name="connsiteX25" fmla="*/ 11832336 w 11832336"/>
+              <a:gd name="connsiteY25" fmla="*/ 0 h 6318504"/>
+              <a:gd name="connsiteX26" fmla="*/ 11832336 w 11832336"/>
+              <a:gd name="connsiteY26" fmla="*/ 6318504 h 6318504"/>
+              <a:gd name="connsiteX27" fmla="*/ 0 w 11832336"/>
+              <a:gd name="connsiteY27" fmla="*/ 6318504 h 6318504"/>
+            </a:gdLst>
+            <a:ahLst/>
+            <a:cxnLst>
+              <a:cxn ang="0">
+                <a:pos x="connsiteX0" y="connsiteY0"/>
+              </a:cxn>
+              <a:cxn ang="0">
+                <a:pos x="connsiteX1" y="connsiteY1"/>
+              </a:cxn>
+              <a:cxn ang="0">
+                <a:pos x="connsiteX2" y="connsiteY2"/>
+              </a:cxn>
+              <a:cxn ang="0">
+                <a:pos x="connsiteX3" y="connsiteY3"/>
+              </a:cxn>
+              <a:cxn ang="0">
+                <a:pos x="connsiteX4" y="connsiteY4"/>
+              </a:cxn>
+              <a:cxn ang="0">
+                <a:pos x="connsiteX5" y="connsiteY5"/>
+              </a:cxn>
+              <a:cxn ang="0">
+                <a:pos x="connsiteX6" y="connsiteY6"/>
+              </a:cxn>
+              <a:cxn ang="0">
+                <a:pos x="connsiteX7" y="connsiteY7"/>
+              </a:cxn>
+              <a:cxn ang="0">
+                <a:pos x="connsiteX8" y="connsiteY8"/>
+              </a:cxn>
+              <a:cxn ang="0">
+                <a:pos x="connsiteX9" y="connsiteY9"/>
+              </a:cxn>
+              <a:cxn ang="0">
+                <a:pos x="connsiteX10" y="connsiteY10"/>
+              </a:cxn>
+              <a:cxn ang="0">
+                <a:pos x="connsiteX11" y="connsiteY11"/>
+              </a:cxn>
+              <a:cxn ang="0">
+                <a:pos x="connsiteX12" y="connsiteY12"/>
+              </a:cxn>
+              <a:cxn ang="0">
+                <a:pos x="connsiteX13" y="connsiteY13"/>
+              </a:cxn>
+              <a:cxn ang="0">
+                <a:pos x="connsiteX14" y="connsiteY14"/>
+              </a:cxn>
+              <a:cxn ang="0">
+                <a:pos x="connsiteX15" y="connsiteY15"/>
+              </a:cxn>
+              <a:cxn ang="0">
+                <a:pos x="connsiteX16" y="connsiteY16"/>
+              </a:cxn>
+              <a:cxn ang="0">
+                <a:pos x="connsiteX17" y="connsiteY17"/>
+              </a:cxn>
+              <a:cxn ang="0">
+                <a:pos x="connsiteX18" y="connsiteY18"/>
+              </a:cxn>
+              <a:cxn ang="0">
+                <a:pos x="connsiteX19" y="connsiteY19"/>
+              </a:cxn>
+              <a:cxn ang="0">
+                <a:pos x="connsiteX20" y="connsiteY20"/>
+              </a:cxn>
+              <a:cxn ang="0">
+                <a:pos x="connsiteX21" y="connsiteY21"/>
+              </a:cxn>
+              <a:cxn ang="0">
+                <a:pos x="connsiteX22" y="connsiteY22"/>
+              </a:cxn>
+              <a:cxn ang="0">
+                <a:pos x="connsiteX23" y="connsiteY23"/>
+              </a:cxn>
+              <a:cxn ang="0">
+                <a:pos x="connsiteX24" y="connsiteY24"/>
+              </a:cxn>
+              <a:cxn ang="0">
+                <a:pos x="connsiteX25" y="connsiteY25"/>
+              </a:cxn>
+              <a:cxn ang="0">
+                <a:pos x="connsiteX26" y="connsiteY26"/>
+              </a:cxn>
+              <a:cxn ang="0">
+                <a:pos x="connsiteX27" y="connsiteY27"/>
+              </a:cxn>
+            </a:cxnLst>
+            <a:rect l="l" t="t" r="r" b="b"/>
+            <a:pathLst>
+              <a:path w="11832336" h="6318504">
+                <a:moveTo>
+                  <a:pt x="4200148" y="4114800"/>
+                </a:moveTo>
+                <a:cubicBezTo>
+                  <a:pt x="4102511" y="4114800"/>
+                  <a:pt x="4023360" y="4193951"/>
+                  <a:pt x="4023360" y="4291588"/>
+                </a:cubicBezTo>
+                <a:lnTo>
+                  <a:pt x="4023360" y="5830820"/>
+                </a:lnTo>
+                <a:cubicBezTo>
+                  <a:pt x="4023360" y="5928457"/>
+                  <a:pt x="4102511" y="6007608"/>
+                  <a:pt x="4200148" y="6007608"/>
+                </a:cubicBezTo>
+                <a:lnTo>
+                  <a:pt x="4907277" y="6007608"/>
+                </a:lnTo>
+                <a:cubicBezTo>
+                  <a:pt x="5004913" y="6007608"/>
+                  <a:pt x="5084064" y="5928457"/>
+                  <a:pt x="5084064" y="5830820"/>
+                </a:cubicBezTo>
+                <a:lnTo>
+                  <a:pt x="5084064" y="4291588"/>
+                </a:lnTo>
+                <a:cubicBezTo>
+                  <a:pt x="5084064" y="4193951"/>
+                  <a:pt x="5004913" y="4114800"/>
+                  <a:pt x="4907277" y="4114800"/>
+                </a:cubicBezTo>
+                <a:close/>
+                <a:moveTo>
+                  <a:pt x="5442717" y="2465832"/>
+                </a:moveTo>
+                <a:cubicBezTo>
+                  <a:pt x="5300189" y="2465832"/>
+                  <a:pt x="5184648" y="2581373"/>
+                  <a:pt x="5184648" y="2723901"/>
+                </a:cubicBezTo>
+                <a:lnTo>
+                  <a:pt x="5184648" y="4286499"/>
+                </a:lnTo>
+                <a:cubicBezTo>
+                  <a:pt x="5184648" y="4429027"/>
+                  <a:pt x="5300189" y="4544568"/>
+                  <a:pt x="5442717" y="4544568"/>
+                </a:cubicBezTo>
+                <a:lnTo>
+                  <a:pt x="6474965" y="4544568"/>
+                </a:lnTo>
+                <a:cubicBezTo>
+                  <a:pt x="6617493" y="4544568"/>
+                  <a:pt x="6733034" y="4429027"/>
+                  <a:pt x="6733034" y="4286499"/>
+                </a:cubicBezTo>
+                <a:lnTo>
+                  <a:pt x="6733034" y="2723901"/>
+                </a:lnTo>
+                <a:cubicBezTo>
+                  <a:pt x="6733034" y="2581373"/>
+                  <a:pt x="6617493" y="2465832"/>
+                  <a:pt x="6474965" y="2465832"/>
+                </a:cubicBezTo>
+                <a:close/>
+                <a:moveTo>
+                  <a:pt x="1475237" y="2139696"/>
+                </a:moveTo>
+                <a:cubicBezTo>
+                  <a:pt x="1327098" y="2139696"/>
+                  <a:pt x="1207008" y="2259786"/>
+                  <a:pt x="1207008" y="2407925"/>
+                </a:cubicBezTo>
+                <a:lnTo>
+                  <a:pt x="1207008" y="3480811"/>
+                </a:lnTo>
+                <a:cubicBezTo>
+                  <a:pt x="1207008" y="3628950"/>
+                  <a:pt x="1327098" y="3749040"/>
+                  <a:pt x="1475237" y="3749040"/>
+                </a:cubicBezTo>
+                <a:lnTo>
+                  <a:pt x="2913883" y="3749040"/>
+                </a:lnTo>
+                <a:cubicBezTo>
+                  <a:pt x="3062022" y="3749040"/>
+                  <a:pt x="3182112" y="3628950"/>
+                  <a:pt x="3182112" y="3480811"/>
+                </a:cubicBezTo>
+                <a:lnTo>
+                  <a:pt x="3182112" y="2407925"/>
+                </a:lnTo>
+                <a:cubicBezTo>
+                  <a:pt x="3182112" y="2259786"/>
+                  <a:pt x="3062022" y="2139696"/>
+                  <a:pt x="2913883" y="2139696"/>
+                </a:cubicBezTo>
+                <a:close/>
+                <a:moveTo>
+                  <a:pt x="0" y="0"/>
+                </a:moveTo>
+                <a:lnTo>
+                  <a:pt x="11832336" y="0"/>
+                </a:lnTo>
+                <a:lnTo>
+                  <a:pt x="11832336" y="6318504"/>
+                </a:lnTo>
+                <a:lnTo>
+                  <a:pt x="0" y="6318504"/>
+                </a:lnTo>
+                <a:close/>
+              </a:path>
+            </a:pathLst>
+          </a:custGeom>
+          <a:solidFill>
+            <a:schemeClr val="dk1">
+              <a:alpha val="64000"/>
+            </a:schemeClr>
+          </a:solidFill>
+        </p:spPr>
+        <p:style>
+          <a:lnRef idx="2">
+            <a:schemeClr val="dk1">
+              <a:shade val="15000"/>
+            </a:schemeClr>
+          </a:lnRef>
+          <a:fillRef idx="1">
+            <a:schemeClr val="dk1"/>
+          </a:fillRef>
+          <a:effectRef idx="0">
+            <a:schemeClr val="dk1"/>
+          </a:effectRef>
+          <a:fontRef idx="minor">
+            <a:schemeClr val="lt1"/>
+          </a:fontRef>
+        </p:style>
+        <p:txBody>
+          <a:bodyPr wrap="square" rtlCol="0" anchor="ctr">
+            <a:noAutofit/>
+          </a:bodyPr>
+          <a:lstStyle/>
+          <a:p>
+            <a:pPr algn="ctr"/>
+            <a:endParaRPr lang="en-SG" dirty="0"/>
+          </a:p>
+        </p:txBody>
+      </p:sp>
+      <p:pic>
+        <p:nvPicPr>
+          <p:cNvPr id="14" name="Picture 13">
+            <a:extLst>
+              <a:ext uri="{FF2B5EF4-FFF2-40B4-BE49-F238E27FC236}">
+                <a16:creationId xmlns:a16="http://schemas.microsoft.com/office/drawing/2014/main" id="{E3E4BE37-2027-3BAD-DC37-E8DCE52DF054}"/>
+              </a:ext>
+            </a:extLst>
+          </p:cNvPr>
+          <p:cNvPicPr>
+            <a:picLocks noChangeAspect="1"/>
+          </p:cNvPicPr>
+          <p:nvPr/>
+        </p:nvPicPr>
+        <p:blipFill>
+          <a:blip r:embed="rId4"/>
+          <a:stretch>
+            <a:fillRect/>
+          </a:stretch>
+        </p:blipFill>
+        <p:spPr>
+          <a:xfrm>
+            <a:off x="7971067" y="719111"/>
+            <a:ext cx="2857143" cy="2057143"/>
+          </a:xfrm>
+          <a:prstGeom prst="rect">
+            <a:avLst/>
+          </a:prstGeom>
+          <a:ln>
+            <a:solidFill>
+              <a:schemeClr val="accent2">
+                <a:lumMod val="20000"/>
+                <a:lumOff val="80000"/>
+              </a:schemeClr>
+            </a:solidFill>
+          </a:ln>
+        </p:spPr>
+      </p:pic>
+      <p:cxnSp>
+        <p:nvCxnSpPr>
+          <p:cNvPr id="16" name="Straight Connector 15">
+            <a:extLst>
+              <a:ext uri="{FF2B5EF4-FFF2-40B4-BE49-F238E27FC236}">
+                <a16:creationId xmlns:a16="http://schemas.microsoft.com/office/drawing/2014/main" id="{F0327C92-69E9-39C6-08ED-44F5FAF3BDFA}"/>
+              </a:ext>
+            </a:extLst>
+          </p:cNvPr>
+          <p:cNvCxnSpPr>
+            <a:cxnSpLocks/>
+          </p:cNvCxnSpPr>
+          <p:nvPr/>
+        </p:nvCxnSpPr>
+        <p:spPr>
+          <a:xfrm flipH="1">
+            <a:off x="2050473" y="1394691"/>
+            <a:ext cx="5938982" cy="0"/>
+          </a:xfrm>
+          <a:prstGeom prst="line">
+            <a:avLst/>
+          </a:prstGeom>
+        </p:spPr>
+        <p:style>
+          <a:lnRef idx="2">
+            <a:schemeClr val="accent4"/>
+          </a:lnRef>
+          <a:fillRef idx="0">
+            <a:schemeClr val="accent4"/>
+          </a:fillRef>
+          <a:effectRef idx="1">
+            <a:schemeClr val="accent4"/>
+          </a:effectRef>
+          <a:fontRef idx="minor">
+            <a:schemeClr val="tx1"/>
+          </a:fontRef>
+        </p:style>
+      </p:cxnSp>
+      <p:cxnSp>
+        <p:nvCxnSpPr>
+          <p:cNvPr id="19" name="Straight Arrow Connector 18">
+            <a:extLst>
+              <a:ext uri="{FF2B5EF4-FFF2-40B4-BE49-F238E27FC236}">
+                <a16:creationId xmlns:a16="http://schemas.microsoft.com/office/drawing/2014/main" id="{72E08AAB-5200-A66D-15AA-ABDC6A6B3020}"/>
+              </a:ext>
+            </a:extLst>
+          </p:cNvPr>
+          <p:cNvCxnSpPr/>
+          <p:nvPr/>
+        </p:nvCxnSpPr>
+        <p:spPr>
+          <a:xfrm>
+            <a:off x="2059709" y="1376218"/>
+            <a:ext cx="0" cy="1634837"/>
+          </a:xfrm>
+          <a:prstGeom prst="straightConnector1">
+            <a:avLst/>
+          </a:prstGeom>
+          <a:ln>
+            <a:tailEnd type="triangle"/>
+          </a:ln>
+        </p:spPr>
+        <p:style>
+          <a:lnRef idx="2">
+            <a:schemeClr val="accent4"/>
+          </a:lnRef>
+          <a:fillRef idx="0">
+            <a:schemeClr val="accent4"/>
+          </a:fillRef>
+          <a:effectRef idx="1">
+            <a:schemeClr val="accent4"/>
+          </a:effectRef>
+          <a:fontRef idx="minor">
+            <a:schemeClr val="tx1"/>
+          </a:fontRef>
+        </p:style>
+      </p:cxnSp>
+      <p:cxnSp>
+        <p:nvCxnSpPr>
+          <p:cNvPr id="20" name="Straight Connector 19">
+            <a:extLst>
+              <a:ext uri="{FF2B5EF4-FFF2-40B4-BE49-F238E27FC236}">
+                <a16:creationId xmlns:a16="http://schemas.microsoft.com/office/drawing/2014/main" id="{A133AB2D-8FAA-4FCF-D924-22E748AD12B0}"/>
+              </a:ext>
+            </a:extLst>
+          </p:cNvPr>
+          <p:cNvCxnSpPr>
+            <a:cxnSpLocks/>
+          </p:cNvCxnSpPr>
+          <p:nvPr/>
+        </p:nvCxnSpPr>
+        <p:spPr>
+          <a:xfrm>
+            <a:off x="8626764" y="2776254"/>
+            <a:ext cx="0" cy="2617782"/>
+          </a:xfrm>
+          <a:prstGeom prst="line">
+            <a:avLst/>
+          </a:prstGeom>
+        </p:spPr>
+        <p:style>
+          <a:lnRef idx="2">
+            <a:schemeClr val="accent4"/>
+          </a:lnRef>
+          <a:fillRef idx="0">
+            <a:schemeClr val="accent4"/>
+          </a:fillRef>
+          <a:effectRef idx="1">
+            <a:schemeClr val="accent4"/>
+          </a:effectRef>
+          <a:fontRef idx="minor">
+            <a:schemeClr val="tx1"/>
+          </a:fontRef>
+        </p:style>
+      </p:cxnSp>
+      <p:cxnSp>
+        <p:nvCxnSpPr>
+          <p:cNvPr id="24" name="Straight Arrow Connector 23">
+            <a:extLst>
+              <a:ext uri="{FF2B5EF4-FFF2-40B4-BE49-F238E27FC236}">
+                <a16:creationId xmlns:a16="http://schemas.microsoft.com/office/drawing/2014/main" id="{730B9ABF-FCDC-177B-2DD7-62C50BAE398A}"/>
+              </a:ext>
+            </a:extLst>
+          </p:cNvPr>
+          <p:cNvCxnSpPr/>
+          <p:nvPr/>
+        </p:nvCxnSpPr>
+        <p:spPr>
+          <a:xfrm flipH="1">
+            <a:off x="5227782" y="5394036"/>
+            <a:ext cx="3398982" cy="0"/>
+          </a:xfrm>
+          <a:prstGeom prst="straightConnector1">
+            <a:avLst/>
+          </a:prstGeom>
+          <a:ln>
+            <a:tailEnd type="triangle"/>
+          </a:ln>
+        </p:spPr>
+        <p:style>
+          <a:lnRef idx="2">
+            <a:schemeClr val="accent4"/>
+          </a:lnRef>
+          <a:fillRef idx="0">
+            <a:schemeClr val="accent4"/>
+          </a:fillRef>
+          <a:effectRef idx="1">
+            <a:schemeClr val="accent4"/>
+          </a:effectRef>
+          <a:fontRef idx="minor">
+            <a:schemeClr val="tx1"/>
+          </a:fontRef>
+        </p:style>
+      </p:cxnSp>
+      <p:cxnSp>
+        <p:nvCxnSpPr>
+          <p:cNvPr id="25" name="Straight Arrow Connector 24">
+            <a:extLst>
+              <a:ext uri="{FF2B5EF4-FFF2-40B4-BE49-F238E27FC236}">
+                <a16:creationId xmlns:a16="http://schemas.microsoft.com/office/drawing/2014/main" id="{DA837382-9D1A-3E1E-6382-D9629D61C8C3}"/>
+              </a:ext>
+            </a:extLst>
+          </p:cNvPr>
+          <p:cNvCxnSpPr>
+            <a:cxnSpLocks/>
+          </p:cNvCxnSpPr>
+          <p:nvPr/>
+        </p:nvCxnSpPr>
+        <p:spPr>
+          <a:xfrm flipH="1">
+            <a:off x="6636328" y="4428836"/>
+            <a:ext cx="1990436" cy="0"/>
+          </a:xfrm>
+          <a:prstGeom prst="straightConnector1">
+            <a:avLst/>
+          </a:prstGeom>
+          <a:ln>
+            <a:tailEnd type="triangle"/>
+          </a:ln>
+        </p:spPr>
+        <p:style>
+          <a:lnRef idx="2">
+            <a:schemeClr val="accent4"/>
+          </a:lnRef>
+          <a:fillRef idx="0">
+            <a:schemeClr val="accent4"/>
+          </a:fillRef>
+          <a:effectRef idx="1">
+            <a:schemeClr val="accent4"/>
+          </a:effectRef>
+          <a:fontRef idx="minor">
+            <a:schemeClr val="tx1"/>
+          </a:fontRef>
+        </p:style>
+      </p:cxnSp>
+      <p:cxnSp>
+        <p:nvCxnSpPr>
+          <p:cNvPr id="31" name="Straight Arrow Connector 30">
+            <a:extLst>
+              <a:ext uri="{FF2B5EF4-FFF2-40B4-BE49-F238E27FC236}">
+                <a16:creationId xmlns:a16="http://schemas.microsoft.com/office/drawing/2014/main" id="{62C1087B-7638-CFC4-C3DD-AF06B3E0F68D}"/>
+              </a:ext>
+            </a:extLst>
+          </p:cNvPr>
+          <p:cNvCxnSpPr>
+            <a:cxnSpLocks/>
+          </p:cNvCxnSpPr>
+          <p:nvPr/>
+        </p:nvCxnSpPr>
+        <p:spPr>
+          <a:xfrm>
+            <a:off x="2615925" y="932873"/>
+            <a:ext cx="0" cy="2382982"/>
+          </a:xfrm>
+          <a:prstGeom prst="straightConnector1">
+            <a:avLst/>
+          </a:prstGeom>
+          <a:ln>
+            <a:solidFill>
+              <a:schemeClr val="bg1"/>
+            </a:solidFill>
+            <a:tailEnd type="triangle"/>
+          </a:ln>
+        </p:spPr>
+        <p:style>
+          <a:lnRef idx="2">
+            <a:schemeClr val="accent4"/>
+          </a:lnRef>
+          <a:fillRef idx="0">
+            <a:schemeClr val="accent4"/>
+          </a:fillRef>
+          <a:effectRef idx="1">
+            <a:schemeClr val="accent4"/>
+          </a:effectRef>
+          <a:fontRef idx="minor">
+            <a:schemeClr val="tx1"/>
+          </a:fontRef>
+        </p:style>
+      </p:cxnSp>
+      <p:cxnSp>
+        <p:nvCxnSpPr>
+          <p:cNvPr id="39" name="Straight Arrow Connector 38">
+            <a:extLst>
+              <a:ext uri="{FF2B5EF4-FFF2-40B4-BE49-F238E27FC236}">
+                <a16:creationId xmlns:a16="http://schemas.microsoft.com/office/drawing/2014/main" id="{B1365CDB-0A97-2527-C1EA-6B4FA6928936}"/>
+              </a:ext>
+            </a:extLst>
+          </p:cNvPr>
+          <p:cNvCxnSpPr>
+            <a:cxnSpLocks/>
+          </p:cNvCxnSpPr>
+          <p:nvPr/>
+        </p:nvCxnSpPr>
+        <p:spPr>
+          <a:xfrm>
+            <a:off x="6425925" y="932873"/>
+            <a:ext cx="0" cy="2169220"/>
+          </a:xfrm>
+          <a:prstGeom prst="straightConnector1">
+            <a:avLst/>
+          </a:prstGeom>
+          <a:ln>
+            <a:solidFill>
+              <a:schemeClr val="bg1"/>
+            </a:solidFill>
+            <a:tailEnd type="triangle"/>
+          </a:ln>
+        </p:spPr>
+        <p:style>
+          <a:lnRef idx="2">
+            <a:schemeClr val="accent4"/>
+          </a:lnRef>
+          <a:fillRef idx="0">
+            <a:schemeClr val="accent4"/>
+          </a:fillRef>
+          <a:effectRef idx="1">
+            <a:schemeClr val="accent4"/>
+          </a:effectRef>
+          <a:fontRef idx="minor">
+            <a:schemeClr val="tx1"/>
+          </a:fontRef>
+        </p:style>
+      </p:cxnSp>
+      <p:cxnSp>
+        <p:nvCxnSpPr>
+          <p:cNvPr id="42" name="Straight Arrow Connector 41">
+            <a:extLst>
+              <a:ext uri="{FF2B5EF4-FFF2-40B4-BE49-F238E27FC236}">
+                <a16:creationId xmlns:a16="http://schemas.microsoft.com/office/drawing/2014/main" id="{B27FEB57-D02F-AE0C-4BF7-7EEF5DFC8C22}"/>
+              </a:ext>
+            </a:extLst>
+          </p:cNvPr>
+          <p:cNvCxnSpPr>
+            <a:cxnSpLocks/>
+          </p:cNvCxnSpPr>
+          <p:nvPr/>
+        </p:nvCxnSpPr>
+        <p:spPr>
+          <a:xfrm>
+            <a:off x="4564798" y="932873"/>
+            <a:ext cx="0" cy="3620654"/>
+          </a:xfrm>
+          <a:prstGeom prst="straightConnector1">
+            <a:avLst/>
+          </a:prstGeom>
+          <a:ln>
+            <a:solidFill>
+              <a:schemeClr val="bg1"/>
+            </a:solidFill>
+            <a:tailEnd type="triangle"/>
+          </a:ln>
+        </p:spPr>
+        <p:style>
+          <a:lnRef idx="2">
+            <a:schemeClr val="accent4"/>
+          </a:lnRef>
+          <a:fillRef idx="0">
+            <a:schemeClr val="accent4"/>
+          </a:fillRef>
+          <a:effectRef idx="1">
+            <a:schemeClr val="accent4"/>
+          </a:effectRef>
+          <a:fontRef idx="minor">
+            <a:schemeClr val="tx1"/>
+          </a:fontRef>
+        </p:style>
+      </p:cxnSp>
+      <p:sp>
+        <p:nvSpPr>
+          <p:cNvPr id="44" name="Rectangle 43">
+            <a:extLst>
+              <a:ext uri="{FF2B5EF4-FFF2-40B4-BE49-F238E27FC236}">
+                <a16:creationId xmlns:a16="http://schemas.microsoft.com/office/drawing/2014/main" id="{317A8E9B-B826-0210-55F9-5D4CB5F1330D}"/>
+              </a:ext>
+            </a:extLst>
+          </p:cNvPr>
+          <p:cNvSpPr/>
+          <p:nvPr/>
+        </p:nvSpPr>
+        <p:spPr>
+          <a:xfrm>
+            <a:off x="2767431" y="1519040"/>
+            <a:ext cx="1645862" cy="338555"/>
+          </a:xfrm>
+          <a:prstGeom prst="rect">
+            <a:avLst/>
+          </a:prstGeom>
+          <a:noFill/>
+          <a:ln>
+            <a:noFill/>
+            <a:prstDash val="sysDash"/>
+          </a:ln>
+        </p:spPr>
+        <p:style>
+          <a:lnRef idx="2">
+            <a:schemeClr val="accent1">
+              <a:shade val="15000"/>
+            </a:schemeClr>
+          </a:lnRef>
+          <a:fillRef idx="1">
+            <a:schemeClr val="accent1"/>
+          </a:fillRef>
+          <a:effectRef idx="0">
+            <a:schemeClr val="accent1"/>
+          </a:effectRef>
+          <a:fontRef idx="minor">
+            <a:schemeClr val="lt1"/>
+          </a:fontRef>
+        </p:style>
+        <p:txBody>
+          <a:bodyPr rtlCol="0" anchor="ctr"/>
+          <a:lstStyle/>
+          <a:p>
+            <a:r>
+              <a:rPr lang="en-US" sz="1200" b="1" dirty="0">
+                <a:solidFill>
+                  <a:schemeClr val="accent1">
+                    <a:lumMod val="60000"/>
+                    <a:lumOff val="40000"/>
+                  </a:schemeClr>
+                </a:solidFill>
+              </a:rPr>
+              <a:t>Energy Battery Scope</a:t>
+            </a:r>
+            <a:endParaRPr lang="en-SG" sz="1200" b="1" dirty="0">
+              <a:solidFill>
+                <a:schemeClr val="accent1">
+                  <a:lumMod val="60000"/>
+                  <a:lumOff val="40000"/>
+                </a:schemeClr>
+              </a:solidFill>
+            </a:endParaRPr>
+          </a:p>
+        </p:txBody>
+      </p:sp>
+      <p:sp>
+        <p:nvSpPr>
+          <p:cNvPr id="45" name="Rectangle 44">
+            <a:extLst>
+              <a:ext uri="{FF2B5EF4-FFF2-40B4-BE49-F238E27FC236}">
+                <a16:creationId xmlns:a16="http://schemas.microsoft.com/office/drawing/2014/main" id="{FD933392-20B5-D056-933A-9D2A4F099A59}"/>
+              </a:ext>
+            </a:extLst>
+          </p:cNvPr>
+          <p:cNvSpPr/>
+          <p:nvPr/>
+        </p:nvSpPr>
+        <p:spPr>
+          <a:xfrm>
+            <a:off x="5188306" y="932872"/>
+            <a:ext cx="1645862" cy="338555"/>
+          </a:xfrm>
+          <a:prstGeom prst="rect">
+            <a:avLst/>
+          </a:prstGeom>
+          <a:noFill/>
+          <a:ln>
+            <a:noFill/>
+            <a:prstDash val="sysDash"/>
+          </a:ln>
+        </p:spPr>
+        <p:style>
+          <a:lnRef idx="2">
+            <a:schemeClr val="accent1">
+              <a:shade val="15000"/>
+            </a:schemeClr>
+          </a:lnRef>
+          <a:fillRef idx="1">
+            <a:schemeClr val="accent1"/>
+          </a:fillRef>
+          <a:effectRef idx="0">
+            <a:schemeClr val="accent1"/>
+          </a:effectRef>
+          <a:fontRef idx="minor">
+            <a:schemeClr val="lt1"/>
+          </a:fontRef>
+        </p:style>
+        <p:txBody>
+          <a:bodyPr rtlCol="0" anchor="ctr"/>
+          <a:lstStyle/>
+          <a:p>
+            <a:r>
+              <a:rPr lang="en-US" sz="1200" b="1" dirty="0">
+                <a:solidFill>
+                  <a:schemeClr val="bg1"/>
+                </a:solidFill>
+              </a:rPr>
+              <a:t>OEM Scope</a:t>
+            </a:r>
+            <a:endParaRPr lang="en-SG" sz="1200" b="1" dirty="0">
+              <a:solidFill>
+                <a:schemeClr val="bg1"/>
+              </a:solidFill>
+            </a:endParaRPr>
+          </a:p>
+        </p:txBody>
+      </p:sp>
+      <p:sp>
+        <p:nvSpPr>
+          <p:cNvPr id="46" name="Rectangle 45">
+            <a:extLst>
+              <a:ext uri="{FF2B5EF4-FFF2-40B4-BE49-F238E27FC236}">
+                <a16:creationId xmlns:a16="http://schemas.microsoft.com/office/drawing/2014/main" id="{E54899B9-2CE9-A3CE-1E17-21AAD0BB5B61}"/>
+              </a:ext>
+            </a:extLst>
+          </p:cNvPr>
+          <p:cNvSpPr/>
+          <p:nvPr/>
+        </p:nvSpPr>
+        <p:spPr>
+          <a:xfrm>
+            <a:off x="7965666" y="626750"/>
+            <a:ext cx="1532114" cy="338539"/>
+          </a:xfrm>
+          <a:prstGeom prst="rect">
+            <a:avLst/>
+          </a:prstGeom>
+        </p:spPr>
+        <p:style>
+          <a:lnRef idx="2">
+            <a:schemeClr val="accent1">
+              <a:shade val="15000"/>
+            </a:schemeClr>
+          </a:lnRef>
+          <a:fillRef idx="1">
+            <a:schemeClr val="accent1"/>
+          </a:fillRef>
+          <a:effectRef idx="0">
+            <a:schemeClr val="accent1"/>
+          </a:effectRef>
+          <a:fontRef idx="minor">
+            <a:schemeClr val="lt1"/>
+          </a:fontRef>
+        </p:style>
+        <p:txBody>
+          <a:bodyPr rtlCol="0" anchor="ctr"/>
+          <a:lstStyle/>
+          <a:p>
+            <a:pPr algn="ctr"/>
+            <a:r>
+              <a:rPr lang="en-US" dirty="0"/>
+              <a:t>BESS</a:t>
+            </a:r>
+            <a:endParaRPr lang="en-SG" dirty="0"/>
+          </a:p>
+        </p:txBody>
+      </p:sp>
+      <p:cxnSp>
+        <p:nvCxnSpPr>
+          <p:cNvPr id="28" name="Straight Connector 27">
+            <a:extLst>
+              <a:ext uri="{FF2B5EF4-FFF2-40B4-BE49-F238E27FC236}">
+                <a16:creationId xmlns:a16="http://schemas.microsoft.com/office/drawing/2014/main" id="{8E074D18-1A79-DAA8-6E38-BF78A4213431}"/>
+              </a:ext>
+            </a:extLst>
+          </p:cNvPr>
+          <p:cNvCxnSpPr>
+            <a:cxnSpLocks/>
+          </p:cNvCxnSpPr>
+          <p:nvPr/>
+        </p:nvCxnSpPr>
+        <p:spPr>
+          <a:xfrm flipH="1">
+            <a:off x="2615925" y="932873"/>
+            <a:ext cx="6881855" cy="0"/>
+          </a:xfrm>
+          <a:prstGeom prst="line">
+            <a:avLst/>
+          </a:prstGeom>
+          <a:ln>
+            <a:solidFill>
+              <a:schemeClr val="bg1"/>
+            </a:solidFill>
+          </a:ln>
+        </p:spPr>
+        <p:style>
+          <a:lnRef idx="2">
+            <a:schemeClr val="accent1"/>
+          </a:lnRef>
+          <a:fillRef idx="0">
+            <a:schemeClr val="accent1"/>
+          </a:fillRef>
+          <a:effectRef idx="1">
+            <a:schemeClr val="accent1"/>
+          </a:effectRef>
+          <a:fontRef idx="minor">
+            <a:schemeClr val="tx1"/>
+          </a:fontRef>
+        </p:style>
+      </p:cxnSp>
+      <p:sp>
+        <p:nvSpPr>
+          <p:cNvPr id="48" name="Rectangle 47">
+            <a:extLst>
+              <a:ext uri="{FF2B5EF4-FFF2-40B4-BE49-F238E27FC236}">
+                <a16:creationId xmlns:a16="http://schemas.microsoft.com/office/drawing/2014/main" id="{0F38AA4D-FC19-6F17-4252-DDED7E9A89DB}"/>
+              </a:ext>
+            </a:extLst>
+          </p:cNvPr>
+          <p:cNvSpPr/>
+          <p:nvPr/>
+        </p:nvSpPr>
+        <p:spPr>
+          <a:xfrm>
+            <a:off x="1540421" y="4137181"/>
+            <a:ext cx="1720003" cy="338555"/>
+          </a:xfrm>
+          <a:prstGeom prst="rect">
+            <a:avLst/>
+          </a:prstGeom>
+          <a:noFill/>
+          <a:ln>
+            <a:noFill/>
+            <a:prstDash val="sysDash"/>
+          </a:ln>
+        </p:spPr>
+        <p:style>
+          <a:lnRef idx="2">
+            <a:schemeClr val="accent1">
+              <a:shade val="15000"/>
+            </a:schemeClr>
+          </a:lnRef>
+          <a:fillRef idx="1">
+            <a:schemeClr val="accent1"/>
+          </a:fillRef>
+          <a:effectRef idx="0">
+            <a:schemeClr val="accent1"/>
+          </a:effectRef>
+          <a:fontRef idx="minor">
+            <a:schemeClr val="lt1"/>
+          </a:fontRef>
+        </p:style>
+        <p:txBody>
+          <a:bodyPr rtlCol="0" anchor="ctr"/>
+          <a:lstStyle/>
+          <a:p>
+            <a:r>
+              <a:rPr lang="en-US" sz="1200" b="1" dirty="0">
+                <a:solidFill>
+                  <a:schemeClr val="accent6">
+                    <a:lumMod val="20000"/>
+                    <a:lumOff val="80000"/>
+                  </a:schemeClr>
+                </a:solidFill>
+              </a:rPr>
+              <a:t>BESS for renewable power source </a:t>
+            </a:r>
+            <a:endParaRPr lang="en-SG" sz="1200" b="1" dirty="0">
+              <a:solidFill>
+                <a:schemeClr val="accent6">
+                  <a:lumMod val="20000"/>
+                  <a:lumOff val="80000"/>
+                </a:schemeClr>
+              </a:solidFill>
+            </a:endParaRPr>
+          </a:p>
+        </p:txBody>
+      </p:sp>
+      <p:sp>
+        <p:nvSpPr>
+          <p:cNvPr id="49" name="Rectangle 48">
+            <a:extLst>
+              <a:ext uri="{FF2B5EF4-FFF2-40B4-BE49-F238E27FC236}">
+                <a16:creationId xmlns:a16="http://schemas.microsoft.com/office/drawing/2014/main" id="{A971E2AB-72E0-2489-E711-45ADBEED0287}"/>
+              </a:ext>
+            </a:extLst>
+          </p:cNvPr>
+          <p:cNvSpPr/>
+          <p:nvPr/>
+        </p:nvSpPr>
+        <p:spPr>
+          <a:xfrm>
+            <a:off x="5235998" y="5797682"/>
+            <a:ext cx="1720003" cy="338555"/>
+          </a:xfrm>
+          <a:prstGeom prst="rect">
+            <a:avLst/>
+          </a:prstGeom>
+          <a:noFill/>
+          <a:ln>
+            <a:noFill/>
+            <a:prstDash val="sysDash"/>
+          </a:ln>
+        </p:spPr>
+        <p:style>
+          <a:lnRef idx="2">
+            <a:schemeClr val="accent1">
+              <a:shade val="15000"/>
+            </a:schemeClr>
+          </a:lnRef>
+          <a:fillRef idx="1">
+            <a:schemeClr val="accent1"/>
+          </a:fillRef>
+          <a:effectRef idx="0">
+            <a:schemeClr val="accent1"/>
+          </a:effectRef>
+          <a:fontRef idx="minor">
+            <a:schemeClr val="lt1"/>
+          </a:fontRef>
+        </p:style>
+        <p:txBody>
+          <a:bodyPr rtlCol="0" anchor="ctr"/>
+          <a:lstStyle/>
+          <a:p>
+            <a:r>
+              <a:rPr lang="en-US" sz="1200" b="1" dirty="0">
+                <a:solidFill>
+                  <a:schemeClr val="accent6">
+                    <a:lumMod val="20000"/>
+                    <a:lumOff val="80000"/>
+                  </a:schemeClr>
+                </a:solidFill>
+              </a:rPr>
+              <a:t>BESS for traditional power plant</a:t>
+            </a:r>
+            <a:endParaRPr lang="en-SG" sz="1200" b="1" dirty="0">
+              <a:solidFill>
+                <a:schemeClr val="accent6">
+                  <a:lumMod val="20000"/>
+                  <a:lumOff val="80000"/>
+                </a:schemeClr>
+              </a:solidFill>
+            </a:endParaRPr>
+          </a:p>
+        </p:txBody>
+      </p:sp>
+      <p:sp>
+        <p:nvSpPr>
+          <p:cNvPr id="50" name="Rectangle 49">
+            <a:extLst>
+              <a:ext uri="{FF2B5EF4-FFF2-40B4-BE49-F238E27FC236}">
+                <a16:creationId xmlns:a16="http://schemas.microsoft.com/office/drawing/2014/main" id="{ADD4E5C1-CF31-92FF-436B-B80A7418037D}"/>
+              </a:ext>
+            </a:extLst>
+          </p:cNvPr>
+          <p:cNvSpPr/>
+          <p:nvPr/>
+        </p:nvSpPr>
+        <p:spPr>
+          <a:xfrm>
+            <a:off x="6834168" y="3415158"/>
+            <a:ext cx="1720003" cy="338555"/>
+          </a:xfrm>
+          <a:prstGeom prst="rect">
+            <a:avLst/>
+          </a:prstGeom>
+          <a:noFill/>
+          <a:ln>
+            <a:noFill/>
+            <a:prstDash val="sysDash"/>
+          </a:ln>
+        </p:spPr>
+        <p:style>
+          <a:lnRef idx="2">
+            <a:schemeClr val="accent1">
+              <a:shade val="15000"/>
+            </a:schemeClr>
+          </a:lnRef>
+          <a:fillRef idx="1">
+            <a:schemeClr val="accent1"/>
+          </a:fillRef>
+          <a:effectRef idx="0">
+            <a:schemeClr val="accent1"/>
+          </a:effectRef>
+          <a:fontRef idx="minor">
+            <a:schemeClr val="lt1"/>
+          </a:fontRef>
+        </p:style>
+        <p:txBody>
+          <a:bodyPr rtlCol="0" anchor="ctr"/>
+          <a:lstStyle/>
+          <a:p>
+            <a:r>
+              <a:rPr lang="en-US" sz="1200" b="1" dirty="0">
+                <a:solidFill>
+                  <a:schemeClr val="accent6">
+                    <a:lumMod val="20000"/>
+                    <a:lumOff val="80000"/>
+                  </a:schemeClr>
+                </a:solidFill>
+              </a:rPr>
+              <a:t>BESS for power station</a:t>
+            </a:r>
+            <a:endParaRPr lang="en-SG" sz="1200" b="1" dirty="0">
+              <a:solidFill>
+                <a:schemeClr val="accent6">
+                  <a:lumMod val="20000"/>
+                  <a:lumOff val="80000"/>
+                </a:schemeClr>
+              </a:solidFill>
+            </a:endParaRPr>
+          </a:p>
+        </p:txBody>
+      </p:sp>
+    </p:spTree>
+    <p:extLst>
+      <p:ext uri="{BB962C8B-B14F-4D97-AF65-F5344CB8AC3E}">
+        <p14:creationId xmlns:p14="http://schemas.microsoft.com/office/powerpoint/2010/main" val="4021267577"/>
+      </p:ext>
+    </p:extLst>
+  </p:cSld>
+  <p:clrMapOvr>
+    <a:masterClrMapping/>
+  </p:clrMapOvr>
+</p:sld>
+</file>
+
+<file path=ppt/slides/slide4.xml><?xml version="1.0" encoding="utf-8"?>
+<p:sld xmlns:a="http://schemas.openxmlformats.org/drawingml/2006/main" xmlns:r="http://schemas.openxmlformats.org/officeDocument/2006/relationships" xmlns:p="http://schemas.openxmlformats.org/presentationml/2006/main">
+  <p:cSld>
+    <p:spTree>
+      <p:nvGrpSpPr>
+        <p:cNvPr id="1" name=""/>
+        <p:cNvGrpSpPr/>
+        <p:nvPr/>
+      </p:nvGrpSpPr>
+      <p:grpSpPr>
+        <a:xfrm>
+          <a:off x="0" y="0"/>
+          <a:ext cx="0" cy="0"/>
+          <a:chOff x="0" y="0"/>
+          <a:chExt cx="0" cy="0"/>
+        </a:xfrm>
+      </p:grpSpPr>
+    </p:spTree>
+    <p:extLst>
+      <p:ext uri="{BB962C8B-B14F-4D97-AF65-F5344CB8AC3E}">
+        <p14:creationId xmlns:p14="http://schemas.microsoft.com/office/powerpoint/2010/main" val="2628990670"/>
       </p:ext>
     </p:extLst>
   </p:cSld>
@@ -4396,4 +6062,319 @@
     </a:ext>
   </a:extLst>
 </a:theme>
+</file>
+
+<file path=ppt/theme/theme2.xml><?xml version="1.0" encoding="utf-8"?>
+<a:theme xmlns:a="http://schemas.openxmlformats.org/drawingml/2006/main" name="Office Theme">
+  <a:themeElements>
+    <a:clrScheme name="Office">
+      <a:dk1>
+        <a:sysClr val="windowText" lastClr="000000"/>
+      </a:dk1>
+      <a:lt1>
+        <a:sysClr val="window" lastClr="FFFFFF"/>
+      </a:lt1>
+      <a:dk2>
+        <a:srgbClr val="0E2841"/>
+      </a:dk2>
+      <a:lt2>
+        <a:srgbClr val="E8E8E8"/>
+      </a:lt2>
+      <a:accent1>
+        <a:srgbClr val="156082"/>
+      </a:accent1>
+      <a:accent2>
+        <a:srgbClr val="E97132"/>
+      </a:accent2>
+      <a:accent3>
+        <a:srgbClr val="196B24"/>
+      </a:accent3>
+      <a:accent4>
+        <a:srgbClr val="0F9ED5"/>
+      </a:accent4>
+      <a:accent5>
+        <a:srgbClr val="A02B93"/>
+      </a:accent5>
+      <a:accent6>
+        <a:srgbClr val="4EA72E"/>
+      </a:accent6>
+      <a:hlink>
+        <a:srgbClr val="467886"/>
+      </a:hlink>
+      <a:folHlink>
+        <a:srgbClr val="96607D"/>
+      </a:folHlink>
+    </a:clrScheme>
+    <a:fontScheme name="Office">
+      <a:majorFont>
+        <a:latin typeface="Aptos Display" panose="02110004020202020204"/>
+        <a:ea typeface=""/>
+        <a:cs typeface=""/>
+        <a:font script="Jpan" typeface="游ゴシック Light"/>
+        <a:font script="Hang" typeface="맑은 고딕"/>
+        <a:font script="Hans" typeface="等线 Light"/>
+        <a:font script="Hant" typeface="新細明體"/>
+        <a:font script="Arab" typeface="Times New Roman"/>
+        <a:font script="Hebr" typeface="Times New Roman"/>
+        <a:font script="Thai" typeface="Angsana New"/>
+        <a:font script="Ethi" typeface="Nyala"/>
+        <a:font script="Beng" typeface="Vrinda"/>
+        <a:font script="Gujr" typeface="Shruti"/>
+        <a:font script="Khmr" typeface="MoolBoran"/>
+        <a:font script="Knda" typeface="Tunga"/>
+        <a:font script="Guru" typeface="Raavi"/>
+        <a:font script="Cans" typeface="Euphemia"/>
+        <a:font script="Cher" typeface="Plantagenet Cherokee"/>
+        <a:font script="Yiii" typeface="Microsoft Yi Baiti"/>
+        <a:font script="Tibt" typeface="Microsoft Himalaya"/>
+        <a:font script="Thaa" typeface="MV Boli"/>
+        <a:font script="Deva" typeface="Mangal"/>
+        <a:font script="Telu" typeface="Gautami"/>
+        <a:font script="Taml" typeface="Latha"/>
+        <a:font script="Syrc" typeface="Estrangelo Edessa"/>
+        <a:font script="Orya" typeface="Kalinga"/>
+        <a:font script="Mlym" typeface="Kartika"/>
+        <a:font script="Laoo" typeface="DokChampa"/>
+        <a:font script="Sinh" typeface="Iskoola Pota"/>
+        <a:font script="Mong" typeface="Mongolian Baiti"/>
+        <a:font script="Viet" typeface="Times New Roman"/>
+        <a:font script="Uigh" typeface="Microsoft Uighur"/>
+        <a:font script="Geor" typeface="Sylfaen"/>
+        <a:font script="Armn" typeface="Arial"/>
+        <a:font script="Bugi" typeface="Leelawadee UI"/>
+        <a:font script="Bopo" typeface="Microsoft JhengHei"/>
+        <a:font script="Java" typeface="Javanese Text"/>
+        <a:font script="Lisu" typeface="Segoe UI"/>
+        <a:font script="Mymr" typeface="Myanmar Text"/>
+        <a:font script="Nkoo" typeface="Ebrima"/>
+        <a:font script="Olck" typeface="Nirmala UI"/>
+        <a:font script="Osma" typeface="Ebrima"/>
+        <a:font script="Phag" typeface="Phagspa"/>
+        <a:font script="Syrn" typeface="Estrangelo Edessa"/>
+        <a:font script="Syrj" typeface="Estrangelo Edessa"/>
+        <a:font script="Syre" typeface="Estrangelo Edessa"/>
+        <a:font script="Sora" typeface="Nirmala UI"/>
+        <a:font script="Tale" typeface="Microsoft Tai Le"/>
+        <a:font script="Talu" typeface="Microsoft New Tai Lue"/>
+        <a:font script="Tfng" typeface="Ebrima"/>
+      </a:majorFont>
+      <a:minorFont>
+        <a:latin typeface="Aptos" panose="02110004020202020204"/>
+        <a:ea typeface=""/>
+        <a:cs typeface=""/>
+        <a:font script="Jpan" typeface="游ゴシック"/>
+        <a:font script="Hang" typeface="맑은 고딕"/>
+        <a:font script="Hans" typeface="等线"/>
+        <a:font script="Hant" typeface="新細明體"/>
+        <a:font script="Arab" typeface="Arial"/>
+        <a:font script="Hebr" typeface="Arial"/>
+        <a:font script="Thai" typeface="Cordia New"/>
+        <a:font script="Ethi" typeface="Nyala"/>
+        <a:font script="Beng" typeface="Vrinda"/>
+        <a:font script="Gujr" typeface="Shruti"/>
+        <a:font script="Khmr" typeface="DaunPenh"/>
+        <a:font script="Knda" typeface="Tunga"/>
+        <a:font script="Guru" typeface="Raavi"/>
+        <a:font script="Cans" typeface="Euphemia"/>
+        <a:font script="Cher" typeface="Plantagenet Cherokee"/>
+        <a:font script="Yiii" typeface="Microsoft Yi Baiti"/>
+        <a:font script="Tibt" typeface="Microsoft Himalaya"/>
+        <a:font script="Thaa" typeface="MV Boli"/>
+        <a:font script="Deva" typeface="Mangal"/>
+        <a:font script="Telu" typeface="Gautami"/>
+        <a:font script="Taml" typeface="Latha"/>
+        <a:font script="Syrc" typeface="Estrangelo Edessa"/>
+        <a:font script="Orya" typeface="Kalinga"/>
+        <a:font script="Mlym" typeface="Kartika"/>
+        <a:font script="Laoo" typeface="DokChampa"/>
+        <a:font script="Sinh" typeface="Iskoola Pota"/>
+        <a:font script="Mong" typeface="Mongolian Baiti"/>
+        <a:font script="Viet" typeface="Arial"/>
+        <a:font script="Uigh" typeface="Microsoft Uighur"/>
+        <a:font script="Geor" typeface="Sylfaen"/>
+        <a:font script="Armn" typeface="Arial"/>
+        <a:font script="Bugi" typeface="Leelawadee UI"/>
+        <a:font script="Bopo" typeface="Microsoft JhengHei"/>
+        <a:font script="Java" typeface="Javanese Text"/>
+        <a:font script="Lisu" typeface="Segoe UI"/>
+        <a:font script="Mymr" typeface="Myanmar Text"/>
+        <a:font script="Nkoo" typeface="Ebrima"/>
+        <a:font script="Olck" typeface="Nirmala UI"/>
+        <a:font script="Osma" typeface="Ebrima"/>
+        <a:font script="Phag" typeface="Phagspa"/>
+        <a:font script="Syrn" typeface="Estrangelo Edessa"/>
+        <a:font script="Syrj" typeface="Estrangelo Edessa"/>
+        <a:font script="Syre" typeface="Estrangelo Edessa"/>
+        <a:font script="Sora" typeface="Nirmala UI"/>
+        <a:font script="Tale" typeface="Microsoft Tai Le"/>
+        <a:font script="Talu" typeface="Microsoft New Tai Lue"/>
+        <a:font script="Tfng" typeface="Ebrima"/>
+      </a:minorFont>
+    </a:fontScheme>
+    <a:fmtScheme name="Office">
+      <a:fillStyleLst>
+        <a:solidFill>
+          <a:schemeClr val="phClr"/>
+        </a:solidFill>
+        <a:gradFill rotWithShape="1">
+          <a:gsLst>
+            <a:gs pos="0">
+              <a:schemeClr val="phClr">
+                <a:lumMod val="110000"/>
+                <a:satMod val="105000"/>
+                <a:tint val="67000"/>
+              </a:schemeClr>
+            </a:gs>
+            <a:gs pos="50000">
+              <a:schemeClr val="phClr">
+                <a:lumMod val="105000"/>
+                <a:satMod val="103000"/>
+                <a:tint val="73000"/>
+              </a:schemeClr>
+            </a:gs>
+            <a:gs pos="100000">
+              <a:schemeClr val="phClr">
+                <a:lumMod val="105000"/>
+                <a:satMod val="109000"/>
+                <a:tint val="81000"/>
+              </a:schemeClr>
+            </a:gs>
+          </a:gsLst>
+          <a:lin ang="5400000" scaled="0"/>
+        </a:gradFill>
+        <a:gradFill rotWithShape="1">
+          <a:gsLst>
+            <a:gs pos="0">
+              <a:schemeClr val="phClr">
+                <a:satMod val="103000"/>
+                <a:lumMod val="102000"/>
+                <a:tint val="94000"/>
+              </a:schemeClr>
+            </a:gs>
+            <a:gs pos="50000">
+              <a:schemeClr val="phClr">
+                <a:satMod val="110000"/>
+                <a:lumMod val="100000"/>
+                <a:shade val="100000"/>
+              </a:schemeClr>
+            </a:gs>
+            <a:gs pos="100000">
+              <a:schemeClr val="phClr">
+                <a:lumMod val="99000"/>
+                <a:satMod val="120000"/>
+                <a:shade val="78000"/>
+              </a:schemeClr>
+            </a:gs>
+          </a:gsLst>
+          <a:lin ang="5400000" scaled="0"/>
+        </a:gradFill>
+      </a:fillStyleLst>
+      <a:lnStyleLst>
+        <a:ln w="12700" cap="flat" cmpd="sng" algn="ctr">
+          <a:solidFill>
+            <a:schemeClr val="phClr"/>
+          </a:solidFill>
+          <a:prstDash val="solid"/>
+          <a:miter lim="800000"/>
+        </a:ln>
+        <a:ln w="19050" cap="flat" cmpd="sng" algn="ctr">
+          <a:solidFill>
+            <a:schemeClr val="phClr"/>
+          </a:solidFill>
+          <a:prstDash val="solid"/>
+          <a:miter lim="800000"/>
+        </a:ln>
+        <a:ln w="25400" cap="flat" cmpd="sng" algn="ctr">
+          <a:solidFill>
+            <a:schemeClr val="phClr"/>
+          </a:solidFill>
+          <a:prstDash val="solid"/>
+          <a:miter lim="800000"/>
+        </a:ln>
+      </a:lnStyleLst>
+      <a:effectStyleLst>
+        <a:effectStyle>
+          <a:effectLst/>
+        </a:effectStyle>
+        <a:effectStyle>
+          <a:effectLst/>
+        </a:effectStyle>
+        <a:effectStyle>
+          <a:effectLst>
+            <a:outerShdw blurRad="57150" dist="19050" dir="5400000" algn="ctr" rotWithShape="0">
+              <a:srgbClr val="000000">
+                <a:alpha val="63000"/>
+              </a:srgbClr>
+            </a:outerShdw>
+          </a:effectLst>
+        </a:effectStyle>
+      </a:effectStyleLst>
+      <a:bgFillStyleLst>
+        <a:solidFill>
+          <a:schemeClr val="phClr"/>
+        </a:solidFill>
+        <a:solidFill>
+          <a:schemeClr val="phClr">
+            <a:tint val="95000"/>
+            <a:satMod val="170000"/>
+          </a:schemeClr>
+        </a:solidFill>
+        <a:gradFill rotWithShape="1">
+          <a:gsLst>
+            <a:gs pos="0">
+              <a:schemeClr val="phClr">
+                <a:tint val="93000"/>
+                <a:satMod val="150000"/>
+                <a:shade val="98000"/>
+                <a:lumMod val="102000"/>
+              </a:schemeClr>
+            </a:gs>
+            <a:gs pos="50000">
+              <a:schemeClr val="phClr">
+                <a:tint val="98000"/>
+                <a:satMod val="130000"/>
+                <a:shade val="90000"/>
+                <a:lumMod val="103000"/>
+              </a:schemeClr>
+            </a:gs>
+            <a:gs pos="100000">
+              <a:schemeClr val="phClr">
+                <a:shade val="63000"/>
+                <a:satMod val="120000"/>
+              </a:schemeClr>
+            </a:gs>
+          </a:gsLst>
+          <a:lin ang="5400000" scaled="0"/>
+        </a:gradFill>
+      </a:bgFillStyleLst>
+    </a:fmtScheme>
+  </a:themeElements>
+  <a:objectDefaults>
+    <a:lnDef>
+      <a:spPr/>
+      <a:bodyPr/>
+      <a:lstStyle/>
+      <a:style>
+        <a:lnRef idx="2">
+          <a:schemeClr val="accent1"/>
+        </a:lnRef>
+        <a:fillRef idx="0">
+          <a:schemeClr val="accent1"/>
+        </a:fillRef>
+        <a:effectRef idx="1">
+          <a:schemeClr val="accent1"/>
+        </a:effectRef>
+        <a:fontRef idx="minor">
+          <a:schemeClr val="tx1"/>
+        </a:fontRef>
+      </a:style>
+    </a:lnDef>
+  </a:objectDefaults>
+  <a:extraClrSchemeLst/>
+  <a:extLst>
+    <a:ext uri="{05A4C25C-085E-4340-85A3-A5531E510DB2}">
+      <thm15:themeFamily xmlns:thm15="http://schemas.microsoft.com/office/thememl/2012/main" name="Office Theme" id="{2E142A2C-CD16-42D6-873A-C26D2A0506FA}" vid="{1BDDFF52-6CD6-40A5-AB3C-68EB2F1E4D0A}"/>
+    </a:ext>
+  </a:extLst>
+</a:theme>
 </file>
</xml_diff>

<commit_message>
Added the table of contents, tile image and update the design document.
</commit_message>
<xml_diff>
--- a/2_SystemDesign_Doc/5_Energy_Storage_System_Design_Img/designDoc.pptx
+++ b/2_SystemDesign_Doc/5_Energy_Storage_System_Design_Img/designDoc.pptx
@@ -200,7 +200,7 @@
           <a:p>
             <a:fld id="{F611CB68-FF1F-4DE3-964A-E6F854C1536F}" type="datetimeFigureOut">
               <a:rPr lang="en-SG" smtClean="0"/>
-              <a:t>9/10/2025</a:t>
+              <a:t>10/10/2025</a:t>
             </a:fld>
             <a:endParaRPr lang="en-SG"/>
           </a:p>
@@ -701,7 +701,7 @@
           <a:p>
             <a:fld id="{459EF112-4185-4C7F-9975-870A6EBFD383}" type="datetimeFigureOut">
               <a:rPr lang="en-SG" smtClean="0"/>
-              <a:t>9/10/2025</a:t>
+              <a:t>10/10/2025</a:t>
             </a:fld>
             <a:endParaRPr lang="en-SG"/>
           </a:p>
@@ -901,7 +901,7 @@
           <a:p>
             <a:fld id="{459EF112-4185-4C7F-9975-870A6EBFD383}" type="datetimeFigureOut">
               <a:rPr lang="en-SG" smtClean="0"/>
-              <a:t>9/10/2025</a:t>
+              <a:t>10/10/2025</a:t>
             </a:fld>
             <a:endParaRPr lang="en-SG"/>
           </a:p>
@@ -1111,7 +1111,7 @@
           <a:p>
             <a:fld id="{459EF112-4185-4C7F-9975-870A6EBFD383}" type="datetimeFigureOut">
               <a:rPr lang="en-SG" smtClean="0"/>
-              <a:t>9/10/2025</a:t>
+              <a:t>10/10/2025</a:t>
             </a:fld>
             <a:endParaRPr lang="en-SG"/>
           </a:p>
@@ -1311,7 +1311,7 @@
           <a:p>
             <a:fld id="{459EF112-4185-4C7F-9975-870A6EBFD383}" type="datetimeFigureOut">
               <a:rPr lang="en-SG" smtClean="0"/>
-              <a:t>9/10/2025</a:t>
+              <a:t>10/10/2025</a:t>
             </a:fld>
             <a:endParaRPr lang="en-SG"/>
           </a:p>
@@ -1587,7 +1587,7 @@
           <a:p>
             <a:fld id="{459EF112-4185-4C7F-9975-870A6EBFD383}" type="datetimeFigureOut">
               <a:rPr lang="en-SG" smtClean="0"/>
-              <a:t>9/10/2025</a:t>
+              <a:t>10/10/2025</a:t>
             </a:fld>
             <a:endParaRPr lang="en-SG"/>
           </a:p>
@@ -1855,7 +1855,7 @@
           <a:p>
             <a:fld id="{459EF112-4185-4C7F-9975-870A6EBFD383}" type="datetimeFigureOut">
               <a:rPr lang="en-SG" smtClean="0"/>
-              <a:t>9/10/2025</a:t>
+              <a:t>10/10/2025</a:t>
             </a:fld>
             <a:endParaRPr lang="en-SG"/>
           </a:p>
@@ -2270,7 +2270,7 @@
           <a:p>
             <a:fld id="{459EF112-4185-4C7F-9975-870A6EBFD383}" type="datetimeFigureOut">
               <a:rPr lang="en-SG" smtClean="0"/>
-              <a:t>9/10/2025</a:t>
+              <a:t>10/10/2025</a:t>
             </a:fld>
             <a:endParaRPr lang="en-SG"/>
           </a:p>
@@ -2412,7 +2412,7 @@
           <a:p>
             <a:fld id="{459EF112-4185-4C7F-9975-870A6EBFD383}" type="datetimeFigureOut">
               <a:rPr lang="en-SG" smtClean="0"/>
-              <a:t>9/10/2025</a:t>
+              <a:t>10/10/2025</a:t>
             </a:fld>
             <a:endParaRPr lang="en-SG"/>
           </a:p>
@@ -2525,7 +2525,7 @@
           <a:p>
             <a:fld id="{459EF112-4185-4C7F-9975-870A6EBFD383}" type="datetimeFigureOut">
               <a:rPr lang="en-SG" smtClean="0"/>
-              <a:t>9/10/2025</a:t>
+              <a:t>10/10/2025</a:t>
             </a:fld>
             <a:endParaRPr lang="en-SG"/>
           </a:p>
@@ -2838,7 +2838,7 @@
           <a:p>
             <a:fld id="{459EF112-4185-4C7F-9975-870A6EBFD383}" type="datetimeFigureOut">
               <a:rPr lang="en-SG" smtClean="0"/>
-              <a:t>9/10/2025</a:t>
+              <a:t>10/10/2025</a:t>
             </a:fld>
             <a:endParaRPr lang="en-SG"/>
           </a:p>
@@ -3127,7 +3127,7 @@
           <a:p>
             <a:fld id="{459EF112-4185-4C7F-9975-870A6EBFD383}" type="datetimeFigureOut">
               <a:rPr lang="en-SG" smtClean="0"/>
-              <a:t>9/10/2025</a:t>
+              <a:t>10/10/2025</a:t>
             </a:fld>
             <a:endParaRPr lang="en-SG"/>
           </a:p>
@@ -3370,7 +3370,7 @@
           <a:p>
             <a:fld id="{459EF112-4185-4C7F-9975-870A6EBFD383}" type="datetimeFigureOut">
               <a:rPr lang="en-SG" smtClean="0"/>
-              <a:t>9/10/2025</a:t>
+              <a:t>10/10/2025</a:t>
             </a:fld>
             <a:endParaRPr lang="en-SG"/>
           </a:p>
@@ -5736,6 +5736,1886 @@
           <a:chExt cx="0" cy="0"/>
         </a:xfrm>
       </p:grpSpPr>
+      <p:sp>
+        <p:nvSpPr>
+          <p:cNvPr id="89" name="Rectangle 88">
+            <a:extLst>
+              <a:ext uri="{FF2B5EF4-FFF2-40B4-BE49-F238E27FC236}">
+                <a16:creationId xmlns:a16="http://schemas.microsoft.com/office/drawing/2014/main" id="{A530A7CB-804C-C296-8FFC-E6BE45B5778A}"/>
+              </a:ext>
+            </a:extLst>
+          </p:cNvPr>
+          <p:cNvSpPr/>
+          <p:nvPr/>
+        </p:nvSpPr>
+        <p:spPr>
+          <a:xfrm>
+            <a:off x="221673" y="212436"/>
+            <a:ext cx="11813309" cy="6465455"/>
+          </a:xfrm>
+          <a:prstGeom prst="rect">
+            <a:avLst/>
+          </a:prstGeom>
+          <a:noFill/>
+        </p:spPr>
+        <p:style>
+          <a:lnRef idx="2">
+            <a:schemeClr val="accent1">
+              <a:shade val="15000"/>
+            </a:schemeClr>
+          </a:lnRef>
+          <a:fillRef idx="1">
+            <a:schemeClr val="accent1"/>
+          </a:fillRef>
+          <a:effectRef idx="0">
+            <a:schemeClr val="accent1"/>
+          </a:effectRef>
+          <a:fontRef idx="minor">
+            <a:schemeClr val="lt1"/>
+          </a:fontRef>
+        </p:style>
+        <p:txBody>
+          <a:bodyPr rtlCol="0" anchor="ctr"/>
+          <a:lstStyle/>
+          <a:p>
+            <a:pPr algn="ctr"/>
+            <a:endParaRPr lang="en-SG"/>
+          </a:p>
+        </p:txBody>
+      </p:sp>
+      <p:sp>
+        <p:nvSpPr>
+          <p:cNvPr id="82" name="Rectangle 81">
+            <a:extLst>
+              <a:ext uri="{FF2B5EF4-FFF2-40B4-BE49-F238E27FC236}">
+                <a16:creationId xmlns:a16="http://schemas.microsoft.com/office/drawing/2014/main" id="{08007BF2-D0F7-994E-8C3F-6E6DF4D9BBEB}"/>
+              </a:ext>
+            </a:extLst>
+          </p:cNvPr>
+          <p:cNvSpPr/>
+          <p:nvPr/>
+        </p:nvSpPr>
+        <p:spPr>
+          <a:xfrm>
+            <a:off x="7991526" y="1085212"/>
+            <a:ext cx="3876535" cy="1355681"/>
+          </a:xfrm>
+          <a:prstGeom prst="rect">
+            <a:avLst/>
+          </a:prstGeom>
+          <a:solidFill>
+            <a:schemeClr val="bg1">
+              <a:lumMod val="95000"/>
+            </a:schemeClr>
+          </a:solidFill>
+        </p:spPr>
+        <p:style>
+          <a:lnRef idx="2">
+            <a:schemeClr val="accent1">
+              <a:shade val="15000"/>
+            </a:schemeClr>
+          </a:lnRef>
+          <a:fillRef idx="1">
+            <a:schemeClr val="accent1"/>
+          </a:fillRef>
+          <a:effectRef idx="0">
+            <a:schemeClr val="accent1"/>
+          </a:effectRef>
+          <a:fontRef idx="minor">
+            <a:schemeClr val="lt1"/>
+          </a:fontRef>
+        </p:style>
+        <p:txBody>
+          <a:bodyPr rtlCol="0" anchor="ctr"/>
+          <a:lstStyle/>
+          <a:p>
+            <a:pPr algn="ctr"/>
+            <a:endParaRPr lang="en-SG"/>
+          </a:p>
+        </p:txBody>
+      </p:sp>
+      <p:pic>
+        <p:nvPicPr>
+          <p:cNvPr id="7" name="Picture 6" descr="A screenshot of a computer program&#10;&#10;AI-generated content may be incorrect.">
+            <a:extLst>
+              <a:ext uri="{FF2B5EF4-FFF2-40B4-BE49-F238E27FC236}">
+                <a16:creationId xmlns:a16="http://schemas.microsoft.com/office/drawing/2014/main" id="{4CD23608-92B8-375F-EB7B-8E4C186D4116}"/>
+              </a:ext>
+            </a:extLst>
+          </p:cNvPr>
+          <p:cNvPicPr>
+            <a:picLocks noChangeAspect="1"/>
+          </p:cNvPicPr>
+          <p:nvPr/>
+        </p:nvPicPr>
+        <p:blipFill>
+          <a:blip r:embed="rId2">
+            <a:extLst>
+              <a:ext uri="{28A0092B-C50C-407E-A947-70E740481C1C}">
+                <a14:useLocalDpi xmlns:a14="http://schemas.microsoft.com/office/drawing/2010/main" val="0"/>
+              </a:ext>
+            </a:extLst>
+          </a:blip>
+          <a:stretch>
+            <a:fillRect/>
+          </a:stretch>
+        </p:blipFill>
+        <p:spPr>
+          <a:xfrm>
+            <a:off x="319646" y="1626501"/>
+            <a:ext cx="5924136" cy="3194097"/>
+          </a:xfrm>
+          <a:prstGeom prst="rect">
+            <a:avLst/>
+          </a:prstGeom>
+        </p:spPr>
+      </p:pic>
+      <p:pic>
+        <p:nvPicPr>
+          <p:cNvPr id="5" name="Picture 4" descr="A diagram of a machine&#10;&#10;AI-generated content may be incorrect.">
+            <a:extLst>
+              <a:ext uri="{FF2B5EF4-FFF2-40B4-BE49-F238E27FC236}">
+                <a16:creationId xmlns:a16="http://schemas.microsoft.com/office/drawing/2014/main" id="{CEE74466-7ED4-009E-18B0-2A53F0315AA9}"/>
+              </a:ext>
+            </a:extLst>
+          </p:cNvPr>
+          <p:cNvPicPr>
+            <a:picLocks noChangeAspect="1"/>
+          </p:cNvPicPr>
+          <p:nvPr/>
+        </p:nvPicPr>
+        <p:blipFill>
+          <a:blip r:embed="rId3">
+            <a:extLst>
+              <a:ext uri="{28A0092B-C50C-407E-A947-70E740481C1C}">
+                <a14:useLocalDpi xmlns:a14="http://schemas.microsoft.com/office/drawing/2010/main" val="0"/>
+              </a:ext>
+            </a:extLst>
+          </a:blip>
+          <a:stretch>
+            <a:fillRect/>
+          </a:stretch>
+        </p:blipFill>
+        <p:spPr>
+          <a:xfrm>
+            <a:off x="4182001" y="1085212"/>
+            <a:ext cx="3809525" cy="1838096"/>
+          </a:xfrm>
+          <a:prstGeom prst="rect">
+            <a:avLst/>
+          </a:prstGeom>
+          <a:ln w="12700">
+            <a:solidFill>
+              <a:schemeClr val="tx1"/>
+            </a:solidFill>
+          </a:ln>
+        </p:spPr>
+      </p:pic>
+      <p:pic>
+        <p:nvPicPr>
+          <p:cNvPr id="10" name="Picture 9">
+            <a:extLst>
+              <a:ext uri="{FF2B5EF4-FFF2-40B4-BE49-F238E27FC236}">
+                <a16:creationId xmlns:a16="http://schemas.microsoft.com/office/drawing/2014/main" id="{1FF9AE00-C0E0-336B-80B6-A08FB125AEFF}"/>
+              </a:ext>
+            </a:extLst>
+          </p:cNvPr>
+          <p:cNvPicPr>
+            <a:picLocks noChangeAspect="1"/>
+          </p:cNvPicPr>
+          <p:nvPr/>
+        </p:nvPicPr>
+        <p:blipFill>
+          <a:blip r:embed="rId4"/>
+          <a:stretch>
+            <a:fillRect/>
+          </a:stretch>
+        </p:blipFill>
+        <p:spPr>
+          <a:xfrm>
+            <a:off x="1150561" y="4992022"/>
+            <a:ext cx="485714" cy="466667"/>
+          </a:xfrm>
+          <a:prstGeom prst="rect">
+            <a:avLst/>
+          </a:prstGeom>
+          <a:ln w="6350">
+            <a:solidFill>
+              <a:schemeClr val="tx1"/>
+            </a:solidFill>
+          </a:ln>
+        </p:spPr>
+      </p:pic>
+      <p:sp>
+        <p:nvSpPr>
+          <p:cNvPr id="11" name="TextBox 10">
+            <a:extLst>
+              <a:ext uri="{FF2B5EF4-FFF2-40B4-BE49-F238E27FC236}">
+                <a16:creationId xmlns:a16="http://schemas.microsoft.com/office/drawing/2014/main" id="{61F3B7CE-93C0-7906-42A7-BC42A88B4DF2}"/>
+              </a:ext>
+            </a:extLst>
+          </p:cNvPr>
+          <p:cNvSpPr txBox="1"/>
+          <p:nvPr/>
+        </p:nvSpPr>
+        <p:spPr>
+          <a:xfrm>
+            <a:off x="783802" y="4780980"/>
+            <a:ext cx="549146" cy="261610"/>
+          </a:xfrm>
+          <a:prstGeom prst="rect">
+            <a:avLst/>
+          </a:prstGeom>
+          <a:noFill/>
+        </p:spPr>
+        <p:txBody>
+          <a:bodyPr wrap="square">
+            <a:spAutoFit/>
+          </a:bodyPr>
+          <a:lstStyle/>
+          <a:p>
+            <a:r>
+              <a:rPr lang="en-SG" sz="1100" b="1" dirty="0"/>
+              <a:t>MU00</a:t>
+            </a:r>
+          </a:p>
+        </p:txBody>
+      </p:sp>
+      <p:pic>
+        <p:nvPicPr>
+          <p:cNvPr id="12" name="Picture 11">
+            <a:extLst>
+              <a:ext uri="{FF2B5EF4-FFF2-40B4-BE49-F238E27FC236}">
+                <a16:creationId xmlns:a16="http://schemas.microsoft.com/office/drawing/2014/main" id="{E41C2F8B-468D-2D8F-26C8-F6FDFC672856}"/>
+              </a:ext>
+            </a:extLst>
+          </p:cNvPr>
+          <p:cNvPicPr>
+            <a:picLocks noChangeAspect="1"/>
+          </p:cNvPicPr>
+          <p:nvPr/>
+        </p:nvPicPr>
+        <p:blipFill>
+          <a:blip r:embed="rId4"/>
+          <a:stretch>
+            <a:fillRect/>
+          </a:stretch>
+        </p:blipFill>
+        <p:spPr>
+          <a:xfrm>
+            <a:off x="2313259" y="5014632"/>
+            <a:ext cx="485714" cy="466667"/>
+          </a:xfrm>
+          <a:prstGeom prst="rect">
+            <a:avLst/>
+          </a:prstGeom>
+          <a:ln w="6350">
+            <a:solidFill>
+              <a:schemeClr val="tx1"/>
+            </a:solidFill>
+          </a:ln>
+        </p:spPr>
+      </p:pic>
+      <p:pic>
+        <p:nvPicPr>
+          <p:cNvPr id="13" name="Picture 12">
+            <a:extLst>
+              <a:ext uri="{FF2B5EF4-FFF2-40B4-BE49-F238E27FC236}">
+                <a16:creationId xmlns:a16="http://schemas.microsoft.com/office/drawing/2014/main" id="{1160C910-9439-3169-4827-772C00F98C16}"/>
+              </a:ext>
+            </a:extLst>
+          </p:cNvPr>
+          <p:cNvPicPr>
+            <a:picLocks noChangeAspect="1"/>
+          </p:cNvPicPr>
+          <p:nvPr/>
+        </p:nvPicPr>
+        <p:blipFill>
+          <a:blip r:embed="rId4"/>
+          <a:stretch>
+            <a:fillRect/>
+          </a:stretch>
+        </p:blipFill>
+        <p:spPr>
+          <a:xfrm>
+            <a:off x="3258684" y="4992340"/>
+            <a:ext cx="485714" cy="466667"/>
+          </a:xfrm>
+          <a:prstGeom prst="rect">
+            <a:avLst/>
+          </a:prstGeom>
+          <a:ln w="6350">
+            <a:solidFill>
+              <a:schemeClr val="tx1"/>
+            </a:solidFill>
+          </a:ln>
+        </p:spPr>
+      </p:pic>
+      <p:sp>
+        <p:nvSpPr>
+          <p:cNvPr id="14" name="TextBox 13">
+            <a:extLst>
+              <a:ext uri="{FF2B5EF4-FFF2-40B4-BE49-F238E27FC236}">
+                <a16:creationId xmlns:a16="http://schemas.microsoft.com/office/drawing/2014/main" id="{03F28546-1A76-3713-CE2B-F3F2E7344097}"/>
+              </a:ext>
+            </a:extLst>
+          </p:cNvPr>
+          <p:cNvSpPr txBox="1"/>
+          <p:nvPr/>
+        </p:nvSpPr>
+        <p:spPr>
+          <a:xfrm>
+            <a:off x="1921917" y="4784958"/>
+            <a:ext cx="549146" cy="261610"/>
+          </a:xfrm>
+          <a:prstGeom prst="rect">
+            <a:avLst/>
+          </a:prstGeom>
+          <a:noFill/>
+        </p:spPr>
+        <p:txBody>
+          <a:bodyPr wrap="square">
+            <a:spAutoFit/>
+          </a:bodyPr>
+          <a:lstStyle/>
+          <a:p>
+            <a:r>
+              <a:rPr lang="en-SG" sz="1100" b="1" dirty="0"/>
+              <a:t>MU01</a:t>
+            </a:r>
+          </a:p>
+        </p:txBody>
+      </p:sp>
+      <p:sp>
+        <p:nvSpPr>
+          <p:cNvPr id="15" name="TextBox 14">
+            <a:extLst>
+              <a:ext uri="{FF2B5EF4-FFF2-40B4-BE49-F238E27FC236}">
+                <a16:creationId xmlns:a16="http://schemas.microsoft.com/office/drawing/2014/main" id="{47627FA7-3828-EAA6-097A-1628156BD046}"/>
+              </a:ext>
+            </a:extLst>
+          </p:cNvPr>
+          <p:cNvSpPr txBox="1"/>
+          <p:nvPr/>
+        </p:nvSpPr>
+        <p:spPr>
+          <a:xfrm>
+            <a:off x="2933579" y="4774634"/>
+            <a:ext cx="549146" cy="261610"/>
+          </a:xfrm>
+          <a:prstGeom prst="rect">
+            <a:avLst/>
+          </a:prstGeom>
+          <a:noFill/>
+        </p:spPr>
+        <p:txBody>
+          <a:bodyPr wrap="square">
+            <a:spAutoFit/>
+          </a:bodyPr>
+          <a:lstStyle/>
+          <a:p>
+            <a:r>
+              <a:rPr lang="en-SG" sz="1100" b="1" dirty="0"/>
+              <a:t>MU02</a:t>
+            </a:r>
+          </a:p>
+        </p:txBody>
+      </p:sp>
+      <p:cxnSp>
+        <p:nvCxnSpPr>
+          <p:cNvPr id="17" name="Straight Connector 16">
+            <a:extLst>
+              <a:ext uri="{FF2B5EF4-FFF2-40B4-BE49-F238E27FC236}">
+                <a16:creationId xmlns:a16="http://schemas.microsoft.com/office/drawing/2014/main" id="{31EE0600-08ED-23D6-32FC-A39C7995FA23}"/>
+              </a:ext>
+            </a:extLst>
+          </p:cNvPr>
+          <p:cNvCxnSpPr>
+            <a:cxnSpLocks/>
+            <a:endCxn id="10" idx="0"/>
+          </p:cNvCxnSpPr>
+          <p:nvPr/>
+        </p:nvCxnSpPr>
+        <p:spPr>
+          <a:xfrm>
+            <a:off x="1393418" y="3408217"/>
+            <a:ext cx="0" cy="1583805"/>
+          </a:xfrm>
+          <a:prstGeom prst="line">
+            <a:avLst/>
+          </a:prstGeom>
+        </p:spPr>
+        <p:style>
+          <a:lnRef idx="2">
+            <a:schemeClr val="accent6"/>
+          </a:lnRef>
+          <a:fillRef idx="0">
+            <a:schemeClr val="accent6"/>
+          </a:fillRef>
+          <a:effectRef idx="1">
+            <a:schemeClr val="accent6"/>
+          </a:effectRef>
+          <a:fontRef idx="minor">
+            <a:schemeClr val="tx1"/>
+          </a:fontRef>
+        </p:style>
+      </p:cxnSp>
+      <p:cxnSp>
+        <p:nvCxnSpPr>
+          <p:cNvPr id="18" name="Straight Connector 17">
+            <a:extLst>
+              <a:ext uri="{FF2B5EF4-FFF2-40B4-BE49-F238E27FC236}">
+                <a16:creationId xmlns:a16="http://schemas.microsoft.com/office/drawing/2014/main" id="{85168BA7-D18B-1C54-9886-FCB440B2DF59}"/>
+              </a:ext>
+            </a:extLst>
+          </p:cNvPr>
+          <p:cNvCxnSpPr>
+            <a:cxnSpLocks/>
+            <a:endCxn id="12" idx="0"/>
+          </p:cNvCxnSpPr>
+          <p:nvPr/>
+        </p:nvCxnSpPr>
+        <p:spPr>
+          <a:xfrm>
+            <a:off x="2556116" y="4618181"/>
+            <a:ext cx="0" cy="396451"/>
+          </a:xfrm>
+          <a:prstGeom prst="line">
+            <a:avLst/>
+          </a:prstGeom>
+        </p:spPr>
+        <p:style>
+          <a:lnRef idx="2">
+            <a:schemeClr val="accent6"/>
+          </a:lnRef>
+          <a:fillRef idx="0">
+            <a:schemeClr val="accent6"/>
+          </a:fillRef>
+          <a:effectRef idx="1">
+            <a:schemeClr val="accent6"/>
+          </a:effectRef>
+          <a:fontRef idx="minor">
+            <a:schemeClr val="tx1"/>
+          </a:fontRef>
+        </p:style>
+      </p:cxnSp>
+      <p:cxnSp>
+        <p:nvCxnSpPr>
+          <p:cNvPr id="20" name="Straight Connector 19">
+            <a:extLst>
+              <a:ext uri="{FF2B5EF4-FFF2-40B4-BE49-F238E27FC236}">
+                <a16:creationId xmlns:a16="http://schemas.microsoft.com/office/drawing/2014/main" id="{482DD8C9-E596-B64D-A74A-AE92D9E18811}"/>
+              </a:ext>
+            </a:extLst>
+          </p:cNvPr>
+          <p:cNvCxnSpPr>
+            <a:cxnSpLocks/>
+            <a:endCxn id="13" idx="0"/>
+          </p:cNvCxnSpPr>
+          <p:nvPr/>
+        </p:nvCxnSpPr>
+        <p:spPr>
+          <a:xfrm>
+            <a:off x="3501541" y="3916217"/>
+            <a:ext cx="0" cy="1076123"/>
+          </a:xfrm>
+          <a:prstGeom prst="line">
+            <a:avLst/>
+          </a:prstGeom>
+        </p:spPr>
+        <p:style>
+          <a:lnRef idx="2">
+            <a:schemeClr val="accent6"/>
+          </a:lnRef>
+          <a:fillRef idx="0">
+            <a:schemeClr val="accent6"/>
+          </a:fillRef>
+          <a:effectRef idx="1">
+            <a:schemeClr val="accent6"/>
+          </a:effectRef>
+          <a:fontRef idx="minor">
+            <a:schemeClr val="tx1"/>
+          </a:fontRef>
+        </p:style>
+      </p:cxnSp>
+      <p:cxnSp>
+        <p:nvCxnSpPr>
+          <p:cNvPr id="25" name="Straight Connector 24">
+            <a:extLst>
+              <a:ext uri="{FF2B5EF4-FFF2-40B4-BE49-F238E27FC236}">
+                <a16:creationId xmlns:a16="http://schemas.microsoft.com/office/drawing/2014/main" id="{D7B25A26-E03C-82D4-07A1-6C69E0361087}"/>
+              </a:ext>
+            </a:extLst>
+          </p:cNvPr>
+          <p:cNvCxnSpPr>
+            <a:stCxn id="10" idx="2"/>
+          </p:cNvCxnSpPr>
+          <p:nvPr/>
+        </p:nvCxnSpPr>
+        <p:spPr>
+          <a:xfrm>
+            <a:off x="1393418" y="5458689"/>
+            <a:ext cx="0" cy="275532"/>
+          </a:xfrm>
+          <a:prstGeom prst="line">
+            <a:avLst/>
+          </a:prstGeom>
+          <a:ln w="28575"/>
+        </p:spPr>
+        <p:style>
+          <a:lnRef idx="2">
+            <a:schemeClr val="accent1"/>
+          </a:lnRef>
+          <a:fillRef idx="0">
+            <a:schemeClr val="accent1"/>
+          </a:fillRef>
+          <a:effectRef idx="1">
+            <a:schemeClr val="accent1"/>
+          </a:effectRef>
+          <a:fontRef idx="minor">
+            <a:schemeClr val="tx1"/>
+          </a:fontRef>
+        </p:style>
+      </p:cxnSp>
+      <p:cxnSp>
+        <p:nvCxnSpPr>
+          <p:cNvPr id="26" name="Straight Connector 25">
+            <a:extLst>
+              <a:ext uri="{FF2B5EF4-FFF2-40B4-BE49-F238E27FC236}">
+                <a16:creationId xmlns:a16="http://schemas.microsoft.com/office/drawing/2014/main" id="{36EE20A8-3475-0E52-5AB4-C5673262381B}"/>
+              </a:ext>
+            </a:extLst>
+          </p:cNvPr>
+          <p:cNvCxnSpPr/>
+          <p:nvPr/>
+        </p:nvCxnSpPr>
+        <p:spPr>
+          <a:xfrm>
+            <a:off x="2556116" y="5481299"/>
+            <a:ext cx="0" cy="275532"/>
+          </a:xfrm>
+          <a:prstGeom prst="line">
+            <a:avLst/>
+          </a:prstGeom>
+          <a:ln w="28575"/>
+        </p:spPr>
+        <p:style>
+          <a:lnRef idx="2">
+            <a:schemeClr val="accent1"/>
+          </a:lnRef>
+          <a:fillRef idx="0">
+            <a:schemeClr val="accent1"/>
+          </a:fillRef>
+          <a:effectRef idx="1">
+            <a:schemeClr val="accent1"/>
+          </a:effectRef>
+          <a:fontRef idx="minor">
+            <a:schemeClr val="tx1"/>
+          </a:fontRef>
+        </p:style>
+      </p:cxnSp>
+      <p:cxnSp>
+        <p:nvCxnSpPr>
+          <p:cNvPr id="27" name="Straight Connector 26">
+            <a:extLst>
+              <a:ext uri="{FF2B5EF4-FFF2-40B4-BE49-F238E27FC236}">
+                <a16:creationId xmlns:a16="http://schemas.microsoft.com/office/drawing/2014/main" id="{74AEC90B-0903-71C9-BE32-3F326866C832}"/>
+              </a:ext>
+            </a:extLst>
+          </p:cNvPr>
+          <p:cNvCxnSpPr/>
+          <p:nvPr/>
+        </p:nvCxnSpPr>
+        <p:spPr>
+          <a:xfrm>
+            <a:off x="3501541" y="5458689"/>
+            <a:ext cx="0" cy="275532"/>
+          </a:xfrm>
+          <a:prstGeom prst="line">
+            <a:avLst/>
+          </a:prstGeom>
+          <a:ln w="28575"/>
+        </p:spPr>
+        <p:style>
+          <a:lnRef idx="2">
+            <a:schemeClr val="accent1"/>
+          </a:lnRef>
+          <a:fillRef idx="0">
+            <a:schemeClr val="accent1"/>
+          </a:fillRef>
+          <a:effectRef idx="1">
+            <a:schemeClr val="accent1"/>
+          </a:effectRef>
+          <a:fontRef idx="minor">
+            <a:schemeClr val="tx1"/>
+          </a:fontRef>
+        </p:style>
+      </p:cxnSp>
+      <p:cxnSp>
+        <p:nvCxnSpPr>
+          <p:cNvPr id="32" name="Straight Connector 31">
+            <a:extLst>
+              <a:ext uri="{FF2B5EF4-FFF2-40B4-BE49-F238E27FC236}">
+                <a16:creationId xmlns:a16="http://schemas.microsoft.com/office/drawing/2014/main" id="{CD74D019-5922-76AA-B8EE-5AA2154D875B}"/>
+              </a:ext>
+            </a:extLst>
+          </p:cNvPr>
+          <p:cNvCxnSpPr>
+            <a:cxnSpLocks/>
+          </p:cNvCxnSpPr>
+          <p:nvPr/>
+        </p:nvCxnSpPr>
+        <p:spPr>
+          <a:xfrm flipV="1">
+            <a:off x="422355" y="5734221"/>
+            <a:ext cx="3549282" cy="22610"/>
+          </a:xfrm>
+          <a:prstGeom prst="line">
+            <a:avLst/>
+          </a:prstGeom>
+          <a:ln w="28575"/>
+        </p:spPr>
+        <p:style>
+          <a:lnRef idx="2">
+            <a:schemeClr val="accent1"/>
+          </a:lnRef>
+          <a:fillRef idx="0">
+            <a:schemeClr val="accent1"/>
+          </a:fillRef>
+          <a:effectRef idx="1">
+            <a:schemeClr val="accent1"/>
+          </a:effectRef>
+          <a:fontRef idx="minor">
+            <a:schemeClr val="tx1"/>
+          </a:fontRef>
+        </p:style>
+      </p:cxnSp>
+      <p:sp>
+        <p:nvSpPr>
+          <p:cNvPr id="34" name="TextBox 33">
+            <a:extLst>
+              <a:ext uri="{FF2B5EF4-FFF2-40B4-BE49-F238E27FC236}">
+                <a16:creationId xmlns:a16="http://schemas.microsoft.com/office/drawing/2014/main" id="{9DC75DEC-B3E9-D6C2-0694-7F1982B4007B}"/>
+              </a:ext>
+            </a:extLst>
+          </p:cNvPr>
+          <p:cNvSpPr txBox="1"/>
+          <p:nvPr/>
+        </p:nvSpPr>
+        <p:spPr>
+          <a:xfrm>
+            <a:off x="319646" y="5472803"/>
+            <a:ext cx="1131119" cy="276999"/>
+          </a:xfrm>
+          <a:prstGeom prst="rect">
+            <a:avLst/>
+          </a:prstGeom>
+          <a:noFill/>
+        </p:spPr>
+        <p:txBody>
+          <a:bodyPr wrap="square">
+            <a:spAutoFit/>
+          </a:bodyPr>
+          <a:lstStyle/>
+          <a:p>
+            <a:r>
+              <a:rPr lang="en-US" sz="1200" b="1" dirty="0"/>
+              <a:t>IEC61850 Bus</a:t>
+            </a:r>
+            <a:endParaRPr lang="en-SG" sz="1200" b="1" dirty="0"/>
+          </a:p>
+        </p:txBody>
+      </p:sp>
+      <p:pic>
+        <p:nvPicPr>
+          <p:cNvPr id="38" name="Picture 37" descr="An electronic device with buttons and a red arrow pointing to the center&#10;&#10;AI-generated content may be incorrect.">
+            <a:extLst>
+              <a:ext uri="{FF2B5EF4-FFF2-40B4-BE49-F238E27FC236}">
+                <a16:creationId xmlns:a16="http://schemas.microsoft.com/office/drawing/2014/main" id="{A059F44D-CAD5-7EA7-B083-3D2914C7DC47}"/>
+              </a:ext>
+            </a:extLst>
+          </p:cNvPr>
+          <p:cNvPicPr>
+            <a:picLocks noChangeAspect="1"/>
+          </p:cNvPicPr>
+          <p:nvPr/>
+        </p:nvPicPr>
+        <p:blipFill>
+          <a:blip r:embed="rId5">
+            <a:extLst>
+              <a:ext uri="{28A0092B-C50C-407E-A947-70E740481C1C}">
+                <a14:useLocalDpi xmlns:a14="http://schemas.microsoft.com/office/drawing/2010/main" val="0"/>
+              </a:ext>
+            </a:extLst>
+          </a:blip>
+          <a:stretch>
+            <a:fillRect/>
+          </a:stretch>
+        </p:blipFill>
+        <p:spPr>
+          <a:xfrm>
+            <a:off x="3997693" y="5138157"/>
+            <a:ext cx="730572" cy="742199"/>
+          </a:xfrm>
+          <a:prstGeom prst="rect">
+            <a:avLst/>
+          </a:prstGeom>
+          <a:ln w="12700">
+            <a:solidFill>
+              <a:schemeClr val="tx1"/>
+            </a:solidFill>
+          </a:ln>
+        </p:spPr>
+      </p:pic>
+      <p:sp>
+        <p:nvSpPr>
+          <p:cNvPr id="39" name="TextBox 38">
+            <a:extLst>
+              <a:ext uri="{FF2B5EF4-FFF2-40B4-BE49-F238E27FC236}">
+                <a16:creationId xmlns:a16="http://schemas.microsoft.com/office/drawing/2014/main" id="{2AB3CD49-6D32-7D3E-F95C-5F3F82952EB4}"/>
+              </a:ext>
+            </a:extLst>
+          </p:cNvPr>
+          <p:cNvSpPr txBox="1"/>
+          <p:nvPr/>
+        </p:nvSpPr>
+        <p:spPr>
+          <a:xfrm>
+            <a:off x="4728265" y="5027802"/>
+            <a:ext cx="1437744" cy="430887"/>
+          </a:xfrm>
+          <a:prstGeom prst="rect">
+            <a:avLst/>
+          </a:prstGeom>
+          <a:noFill/>
+        </p:spPr>
+        <p:txBody>
+          <a:bodyPr wrap="square">
+            <a:spAutoFit/>
+          </a:bodyPr>
+          <a:lstStyle/>
+          <a:p>
+            <a:r>
+              <a:rPr lang="en-US" sz="1100" b="1" dirty="0"/>
+              <a:t>AC500 PLC Simulator </a:t>
+            </a:r>
+            <a:endParaRPr lang="en-SG" sz="1100" b="1" dirty="0"/>
+          </a:p>
+        </p:txBody>
+      </p:sp>
+      <p:cxnSp>
+        <p:nvCxnSpPr>
+          <p:cNvPr id="40" name="Straight Connector 39">
+            <a:extLst>
+              <a:ext uri="{FF2B5EF4-FFF2-40B4-BE49-F238E27FC236}">
+                <a16:creationId xmlns:a16="http://schemas.microsoft.com/office/drawing/2014/main" id="{47BE2184-3FC2-B747-EA00-BABF2888BCC1}"/>
+              </a:ext>
+            </a:extLst>
+          </p:cNvPr>
+          <p:cNvCxnSpPr>
+            <a:cxnSpLocks/>
+          </p:cNvCxnSpPr>
+          <p:nvPr/>
+        </p:nvCxnSpPr>
+        <p:spPr>
+          <a:xfrm>
+            <a:off x="4746890" y="5683717"/>
+            <a:ext cx="1739749" cy="0"/>
+          </a:xfrm>
+          <a:prstGeom prst="line">
+            <a:avLst/>
+          </a:prstGeom>
+          <a:ln w="28575"/>
+        </p:spPr>
+        <p:style>
+          <a:lnRef idx="2">
+            <a:schemeClr val="accent1"/>
+          </a:lnRef>
+          <a:fillRef idx="0">
+            <a:schemeClr val="accent1"/>
+          </a:fillRef>
+          <a:effectRef idx="1">
+            <a:schemeClr val="accent1"/>
+          </a:effectRef>
+          <a:fontRef idx="minor">
+            <a:schemeClr val="tx1"/>
+          </a:fontRef>
+        </p:style>
+      </p:cxnSp>
+      <p:sp>
+        <p:nvSpPr>
+          <p:cNvPr id="43" name="TextBox 42">
+            <a:extLst>
+              <a:ext uri="{FF2B5EF4-FFF2-40B4-BE49-F238E27FC236}">
+                <a16:creationId xmlns:a16="http://schemas.microsoft.com/office/drawing/2014/main" id="{F215B550-9E28-EA5C-072F-DBDA158423C6}"/>
+              </a:ext>
+            </a:extLst>
+          </p:cNvPr>
+          <p:cNvSpPr txBox="1"/>
+          <p:nvPr/>
+        </p:nvSpPr>
+        <p:spPr>
+          <a:xfrm>
+            <a:off x="4783834" y="5472802"/>
+            <a:ext cx="1601119" cy="276999"/>
+          </a:xfrm>
+          <a:prstGeom prst="rect">
+            <a:avLst/>
+          </a:prstGeom>
+          <a:noFill/>
+        </p:spPr>
+        <p:txBody>
+          <a:bodyPr wrap="square">
+            <a:spAutoFit/>
+          </a:bodyPr>
+          <a:lstStyle/>
+          <a:p>
+            <a:r>
+              <a:rPr lang="en-US" sz="1200" b="1" dirty="0"/>
+              <a:t>IEC60870-5-104  Bus</a:t>
+            </a:r>
+            <a:endParaRPr lang="en-SG" sz="1200" b="1" dirty="0"/>
+          </a:p>
+        </p:txBody>
+      </p:sp>
+      <p:pic>
+        <p:nvPicPr>
+          <p:cNvPr id="45" name="Picture 44" descr="A computer screen shot of a power distribution system&#10;&#10;AI-generated content may be incorrect.">
+            <a:extLst>
+              <a:ext uri="{FF2B5EF4-FFF2-40B4-BE49-F238E27FC236}">
+                <a16:creationId xmlns:a16="http://schemas.microsoft.com/office/drawing/2014/main" id="{28B4D533-00B7-5C5E-1C6E-EAAD471CE60D}"/>
+              </a:ext>
+            </a:extLst>
+          </p:cNvPr>
+          <p:cNvPicPr>
+            <a:picLocks noChangeAspect="1"/>
+          </p:cNvPicPr>
+          <p:nvPr/>
+        </p:nvPicPr>
+        <p:blipFill>
+          <a:blip r:embed="rId6">
+            <a:extLst>
+              <a:ext uri="{28A0092B-C50C-407E-A947-70E740481C1C}">
+                <a14:useLocalDpi xmlns:a14="http://schemas.microsoft.com/office/drawing/2010/main" val="0"/>
+              </a:ext>
+            </a:extLst>
+          </a:blip>
+          <a:stretch>
+            <a:fillRect/>
+          </a:stretch>
+        </p:blipFill>
+        <p:spPr>
+          <a:xfrm>
+            <a:off x="6486638" y="3008250"/>
+            <a:ext cx="5343445" cy="2872102"/>
+          </a:xfrm>
+          <a:prstGeom prst="rect">
+            <a:avLst/>
+          </a:prstGeom>
+          <a:ln w="12700">
+            <a:solidFill>
+              <a:schemeClr val="tx1"/>
+            </a:solidFill>
+          </a:ln>
+        </p:spPr>
+      </p:pic>
+      <p:sp>
+        <p:nvSpPr>
+          <p:cNvPr id="46" name="TextBox 45">
+            <a:extLst>
+              <a:ext uri="{FF2B5EF4-FFF2-40B4-BE49-F238E27FC236}">
+                <a16:creationId xmlns:a16="http://schemas.microsoft.com/office/drawing/2014/main" id="{D2B623E9-A0C8-B39D-6FE7-E4E6EAED1FAD}"/>
+              </a:ext>
+            </a:extLst>
+          </p:cNvPr>
+          <p:cNvSpPr txBox="1"/>
+          <p:nvPr/>
+        </p:nvSpPr>
+        <p:spPr>
+          <a:xfrm>
+            <a:off x="4102967" y="1015107"/>
+            <a:ext cx="1983796" cy="461665"/>
+          </a:xfrm>
+          <a:prstGeom prst="rect">
+            <a:avLst/>
+          </a:prstGeom>
+          <a:noFill/>
+        </p:spPr>
+        <p:txBody>
+          <a:bodyPr wrap="square">
+            <a:spAutoFit/>
+          </a:bodyPr>
+          <a:lstStyle/>
+          <a:p>
+            <a:r>
+              <a:rPr lang="en-US" sz="1200" b="1" dirty="0"/>
+              <a:t>Battery Based Energy Storage System (BESS)</a:t>
+            </a:r>
+            <a:endParaRPr lang="en-SG" sz="1200" b="1" dirty="0"/>
+          </a:p>
+        </p:txBody>
+      </p:sp>
+      <p:sp>
+        <p:nvSpPr>
+          <p:cNvPr id="47" name="TextBox 46">
+            <a:extLst>
+              <a:ext uri="{FF2B5EF4-FFF2-40B4-BE49-F238E27FC236}">
+                <a16:creationId xmlns:a16="http://schemas.microsoft.com/office/drawing/2014/main" id="{96816761-6C12-82EC-C37C-2105CB96B63A}"/>
+              </a:ext>
+            </a:extLst>
+          </p:cNvPr>
+          <p:cNvSpPr txBox="1"/>
+          <p:nvPr/>
+        </p:nvSpPr>
+        <p:spPr>
+          <a:xfrm>
+            <a:off x="320993" y="5891291"/>
+            <a:ext cx="4003554" cy="253916"/>
+          </a:xfrm>
+          <a:prstGeom prst="rect">
+            <a:avLst/>
+          </a:prstGeom>
+          <a:noFill/>
+        </p:spPr>
+        <p:txBody>
+          <a:bodyPr wrap="square">
+            <a:spAutoFit/>
+          </a:bodyPr>
+          <a:lstStyle/>
+          <a:p>
+            <a:r>
+              <a:rPr lang="en-US" sz="1050" b="1" dirty="0">
+                <a:solidFill>
+                  <a:schemeClr val="tx1">
+                    <a:lumMod val="50000"/>
+                    <a:lumOff val="50000"/>
+                  </a:schemeClr>
+                </a:solidFill>
+              </a:rPr>
+              <a:t>GOOSE (Generic Object-Oriented Substation Event) Network </a:t>
+            </a:r>
+            <a:endParaRPr lang="en-SG" sz="1050" b="1" dirty="0">
+              <a:solidFill>
+                <a:schemeClr val="tx1">
+                  <a:lumMod val="50000"/>
+                  <a:lumOff val="50000"/>
+                </a:schemeClr>
+              </a:solidFill>
+            </a:endParaRPr>
+          </a:p>
+        </p:txBody>
+      </p:sp>
+      <p:sp>
+        <p:nvSpPr>
+          <p:cNvPr id="48" name="TextBox 47">
+            <a:extLst>
+              <a:ext uri="{FF2B5EF4-FFF2-40B4-BE49-F238E27FC236}">
+                <a16:creationId xmlns:a16="http://schemas.microsoft.com/office/drawing/2014/main" id="{E4B317F1-51F0-E4A7-E81A-767AEBC7E072}"/>
+              </a:ext>
+            </a:extLst>
+          </p:cNvPr>
+          <p:cNvSpPr txBox="1"/>
+          <p:nvPr/>
+        </p:nvSpPr>
+        <p:spPr>
+          <a:xfrm>
+            <a:off x="4798702" y="5882018"/>
+            <a:ext cx="4003554" cy="253916"/>
+          </a:xfrm>
+          <a:prstGeom prst="rect">
+            <a:avLst/>
+          </a:prstGeom>
+          <a:noFill/>
+        </p:spPr>
+        <p:txBody>
+          <a:bodyPr wrap="square">
+            <a:spAutoFit/>
+          </a:bodyPr>
+          <a:lstStyle/>
+          <a:p>
+            <a:r>
+              <a:rPr lang="en-US" sz="1050" b="1" dirty="0">
+                <a:solidFill>
+                  <a:schemeClr val="accent6">
+                    <a:lumMod val="75000"/>
+                  </a:schemeClr>
+                </a:solidFill>
+              </a:rPr>
+              <a:t>SCADA (Supervisory Control and Data Acquisition)  Network</a:t>
+            </a:r>
+            <a:endParaRPr lang="en-SG" sz="1050" b="1" dirty="0">
+              <a:solidFill>
+                <a:schemeClr val="accent6">
+                  <a:lumMod val="75000"/>
+                </a:schemeClr>
+              </a:solidFill>
+            </a:endParaRPr>
+          </a:p>
+        </p:txBody>
+      </p:sp>
+      <p:cxnSp>
+        <p:nvCxnSpPr>
+          <p:cNvPr id="50" name="Straight Connector 49">
+            <a:extLst>
+              <a:ext uri="{FF2B5EF4-FFF2-40B4-BE49-F238E27FC236}">
+                <a16:creationId xmlns:a16="http://schemas.microsoft.com/office/drawing/2014/main" id="{A71CD03A-5FA6-4BFB-F6DE-FD5CF344555B}"/>
+              </a:ext>
+            </a:extLst>
+          </p:cNvPr>
+          <p:cNvCxnSpPr>
+            <a:cxnSpLocks/>
+          </p:cNvCxnSpPr>
+          <p:nvPr/>
+        </p:nvCxnSpPr>
+        <p:spPr>
+          <a:xfrm flipV="1">
+            <a:off x="4362979" y="3117271"/>
+            <a:ext cx="0" cy="2020886"/>
+          </a:xfrm>
+          <a:prstGeom prst="line">
+            <a:avLst/>
+          </a:prstGeom>
+          <a:ln>
+            <a:solidFill>
+              <a:srgbClr val="FF0000"/>
+            </a:solidFill>
+          </a:ln>
+        </p:spPr>
+        <p:style>
+          <a:lnRef idx="2">
+            <a:schemeClr val="accent1"/>
+          </a:lnRef>
+          <a:fillRef idx="0">
+            <a:schemeClr val="accent1"/>
+          </a:fillRef>
+          <a:effectRef idx="1">
+            <a:schemeClr val="accent1"/>
+          </a:effectRef>
+          <a:fontRef idx="minor">
+            <a:schemeClr val="tx1"/>
+          </a:fontRef>
+        </p:style>
+      </p:cxnSp>
+      <p:cxnSp>
+        <p:nvCxnSpPr>
+          <p:cNvPr id="52" name="Straight Connector 51">
+            <a:extLst>
+              <a:ext uri="{FF2B5EF4-FFF2-40B4-BE49-F238E27FC236}">
+                <a16:creationId xmlns:a16="http://schemas.microsoft.com/office/drawing/2014/main" id="{6F450950-2DCB-CD39-BA76-33F4AB533634}"/>
+              </a:ext>
+            </a:extLst>
+          </p:cNvPr>
+          <p:cNvCxnSpPr>
+            <a:cxnSpLocks/>
+          </p:cNvCxnSpPr>
+          <p:nvPr/>
+        </p:nvCxnSpPr>
+        <p:spPr>
+          <a:xfrm>
+            <a:off x="2933579" y="4322617"/>
+            <a:ext cx="1429400" cy="0"/>
+          </a:xfrm>
+          <a:prstGeom prst="line">
+            <a:avLst/>
+          </a:prstGeom>
+          <a:ln>
+            <a:solidFill>
+              <a:srgbClr val="FF0000"/>
+            </a:solidFill>
+          </a:ln>
+        </p:spPr>
+        <p:style>
+          <a:lnRef idx="2">
+            <a:schemeClr val="accent1"/>
+          </a:lnRef>
+          <a:fillRef idx="0">
+            <a:schemeClr val="accent1"/>
+          </a:fillRef>
+          <a:effectRef idx="1">
+            <a:schemeClr val="accent1"/>
+          </a:effectRef>
+          <a:fontRef idx="minor">
+            <a:schemeClr val="tx1"/>
+          </a:fontRef>
+        </p:style>
+      </p:cxnSp>
+      <p:cxnSp>
+        <p:nvCxnSpPr>
+          <p:cNvPr id="55" name="Straight Connector 54">
+            <a:extLst>
+              <a:ext uri="{FF2B5EF4-FFF2-40B4-BE49-F238E27FC236}">
+                <a16:creationId xmlns:a16="http://schemas.microsoft.com/office/drawing/2014/main" id="{E13198D5-2AD0-6B7D-F3D8-4DF0FD0BCD59}"/>
+              </a:ext>
+            </a:extLst>
+          </p:cNvPr>
+          <p:cNvCxnSpPr>
+            <a:cxnSpLocks/>
+          </p:cNvCxnSpPr>
+          <p:nvPr/>
+        </p:nvCxnSpPr>
+        <p:spPr>
+          <a:xfrm>
+            <a:off x="3713298" y="3117271"/>
+            <a:ext cx="649681" cy="0"/>
+          </a:xfrm>
+          <a:prstGeom prst="line">
+            <a:avLst/>
+          </a:prstGeom>
+          <a:ln>
+            <a:solidFill>
+              <a:srgbClr val="FF0000"/>
+            </a:solidFill>
+          </a:ln>
+        </p:spPr>
+        <p:style>
+          <a:lnRef idx="2">
+            <a:schemeClr val="accent1"/>
+          </a:lnRef>
+          <a:fillRef idx="0">
+            <a:schemeClr val="accent1"/>
+          </a:fillRef>
+          <a:effectRef idx="1">
+            <a:schemeClr val="accent1"/>
+          </a:effectRef>
+          <a:fontRef idx="minor">
+            <a:schemeClr val="tx1"/>
+          </a:fontRef>
+        </p:style>
+      </p:cxnSp>
+      <p:cxnSp>
+        <p:nvCxnSpPr>
+          <p:cNvPr id="60" name="Straight Connector 59">
+            <a:extLst>
+              <a:ext uri="{FF2B5EF4-FFF2-40B4-BE49-F238E27FC236}">
+                <a16:creationId xmlns:a16="http://schemas.microsoft.com/office/drawing/2014/main" id="{638FBDE5-9BA4-C2F9-12A8-69168ACC7326}"/>
+              </a:ext>
+            </a:extLst>
+          </p:cNvPr>
+          <p:cNvCxnSpPr>
+            <a:cxnSpLocks/>
+          </p:cNvCxnSpPr>
+          <p:nvPr/>
+        </p:nvCxnSpPr>
+        <p:spPr>
+          <a:xfrm>
+            <a:off x="1754909" y="4730387"/>
+            <a:ext cx="2608070" cy="0"/>
+          </a:xfrm>
+          <a:prstGeom prst="line">
+            <a:avLst/>
+          </a:prstGeom>
+          <a:ln>
+            <a:solidFill>
+              <a:srgbClr val="FF0000"/>
+            </a:solidFill>
+          </a:ln>
+        </p:spPr>
+        <p:style>
+          <a:lnRef idx="2">
+            <a:schemeClr val="accent1"/>
+          </a:lnRef>
+          <a:fillRef idx="0">
+            <a:schemeClr val="accent1"/>
+          </a:fillRef>
+          <a:effectRef idx="1">
+            <a:schemeClr val="accent1"/>
+          </a:effectRef>
+          <a:fontRef idx="minor">
+            <a:schemeClr val="tx1"/>
+          </a:fontRef>
+        </p:style>
+      </p:cxnSp>
+      <p:cxnSp>
+        <p:nvCxnSpPr>
+          <p:cNvPr id="62" name="Straight Connector 61">
+            <a:extLst>
+              <a:ext uri="{FF2B5EF4-FFF2-40B4-BE49-F238E27FC236}">
+                <a16:creationId xmlns:a16="http://schemas.microsoft.com/office/drawing/2014/main" id="{250DE042-E89A-7BD2-B52D-3C47BF156D33}"/>
+              </a:ext>
+            </a:extLst>
+          </p:cNvPr>
+          <p:cNvCxnSpPr>
+            <a:cxnSpLocks/>
+          </p:cNvCxnSpPr>
+          <p:nvPr/>
+        </p:nvCxnSpPr>
+        <p:spPr>
+          <a:xfrm>
+            <a:off x="1754909" y="3515805"/>
+            <a:ext cx="0" cy="1214582"/>
+          </a:xfrm>
+          <a:prstGeom prst="line">
+            <a:avLst/>
+          </a:prstGeom>
+          <a:ln>
+            <a:solidFill>
+              <a:srgbClr val="FF0000"/>
+            </a:solidFill>
+          </a:ln>
+        </p:spPr>
+        <p:style>
+          <a:lnRef idx="2">
+            <a:schemeClr val="accent1"/>
+          </a:lnRef>
+          <a:fillRef idx="0">
+            <a:schemeClr val="accent1"/>
+          </a:fillRef>
+          <a:effectRef idx="1">
+            <a:schemeClr val="accent1"/>
+          </a:effectRef>
+          <a:fontRef idx="minor">
+            <a:schemeClr val="tx1"/>
+          </a:fontRef>
+        </p:style>
+      </p:cxnSp>
+      <p:sp>
+        <p:nvSpPr>
+          <p:cNvPr id="68" name="TextBox 67">
+            <a:extLst>
+              <a:ext uri="{FF2B5EF4-FFF2-40B4-BE49-F238E27FC236}">
+                <a16:creationId xmlns:a16="http://schemas.microsoft.com/office/drawing/2014/main" id="{4D20CB97-6CB8-3EE9-97BA-ACE2867A52F6}"/>
+              </a:ext>
+            </a:extLst>
+          </p:cNvPr>
+          <p:cNvSpPr txBox="1"/>
+          <p:nvPr/>
+        </p:nvSpPr>
+        <p:spPr>
+          <a:xfrm>
+            <a:off x="1327880" y="1149245"/>
+            <a:ext cx="2966265" cy="523220"/>
+          </a:xfrm>
+          <a:prstGeom prst="rect">
+            <a:avLst/>
+          </a:prstGeom>
+          <a:noFill/>
+        </p:spPr>
+        <p:txBody>
+          <a:bodyPr wrap="square">
+            <a:spAutoFit/>
+          </a:bodyPr>
+          <a:lstStyle/>
+          <a:p>
+            <a:r>
+              <a:rPr lang="en-US" sz="1400" b="1" dirty="0"/>
+              <a:t>Power Grid Cyber Range Physical World  OT Components Simulator</a:t>
+            </a:r>
+            <a:endParaRPr lang="en-SG" sz="1400" b="1" dirty="0"/>
+          </a:p>
+        </p:txBody>
+      </p:sp>
+      <p:sp>
+        <p:nvSpPr>
+          <p:cNvPr id="69" name="TextBox 68">
+            <a:extLst>
+              <a:ext uri="{FF2B5EF4-FFF2-40B4-BE49-F238E27FC236}">
+                <a16:creationId xmlns:a16="http://schemas.microsoft.com/office/drawing/2014/main" id="{03753587-896C-EDBF-3F37-C1A8FC8D5609}"/>
+              </a:ext>
+            </a:extLst>
+          </p:cNvPr>
+          <p:cNvSpPr txBox="1"/>
+          <p:nvPr/>
+        </p:nvSpPr>
+        <p:spPr>
+          <a:xfrm>
+            <a:off x="7992919" y="2525835"/>
+            <a:ext cx="3681310" cy="523220"/>
+          </a:xfrm>
+          <a:prstGeom prst="rect">
+            <a:avLst/>
+          </a:prstGeom>
+          <a:noFill/>
+        </p:spPr>
+        <p:txBody>
+          <a:bodyPr wrap="square">
+            <a:spAutoFit/>
+          </a:bodyPr>
+          <a:lstStyle/>
+          <a:p>
+            <a:r>
+              <a:rPr lang="en-US" sz="1400" b="1" dirty="0"/>
+              <a:t>Power Grid Cyber Range Operator Human Machine Interface </a:t>
+            </a:r>
+            <a:endParaRPr lang="en-SG" sz="1400" b="1" dirty="0"/>
+          </a:p>
+        </p:txBody>
+      </p:sp>
+      <p:pic>
+        <p:nvPicPr>
+          <p:cNvPr id="71" name="Picture 70" descr="A screenshot of a computer&#10;&#10;AI-generated content may be incorrect.">
+            <a:extLst>
+              <a:ext uri="{FF2B5EF4-FFF2-40B4-BE49-F238E27FC236}">
+                <a16:creationId xmlns:a16="http://schemas.microsoft.com/office/drawing/2014/main" id="{CA8BD37C-4C0B-A24B-C038-7027F2649794}"/>
+              </a:ext>
+            </a:extLst>
+          </p:cNvPr>
+          <p:cNvPicPr>
+            <a:picLocks noChangeAspect="1"/>
+          </p:cNvPicPr>
+          <p:nvPr/>
+        </p:nvPicPr>
+        <p:blipFill>
+          <a:blip r:embed="rId7">
+            <a:extLst>
+              <a:ext uri="{28A0092B-C50C-407E-A947-70E740481C1C}">
+                <a14:useLocalDpi xmlns:a14="http://schemas.microsoft.com/office/drawing/2010/main" val="0"/>
+              </a:ext>
+            </a:extLst>
+          </a:blip>
+          <a:srcRect r="17674"/>
+          <a:stretch>
+            <a:fillRect/>
+          </a:stretch>
+        </p:blipFill>
+        <p:spPr>
+          <a:xfrm>
+            <a:off x="8108070" y="1468791"/>
+            <a:ext cx="903511" cy="815821"/>
+          </a:xfrm>
+          <a:prstGeom prst="rect">
+            <a:avLst/>
+          </a:prstGeom>
+          <a:ln w="19050">
+            <a:solidFill>
+              <a:schemeClr val="tx1"/>
+            </a:solidFill>
+          </a:ln>
+        </p:spPr>
+      </p:pic>
+      <p:pic>
+        <p:nvPicPr>
+          <p:cNvPr id="73" name="Picture 72" descr="A computer screen shot of a diagram&#10;&#10;AI-generated content may be incorrect.">
+            <a:extLst>
+              <a:ext uri="{FF2B5EF4-FFF2-40B4-BE49-F238E27FC236}">
+                <a16:creationId xmlns:a16="http://schemas.microsoft.com/office/drawing/2014/main" id="{94B043B6-8675-6975-0963-2F4C5C0652A7}"/>
+              </a:ext>
+            </a:extLst>
+          </p:cNvPr>
+          <p:cNvPicPr>
+            <a:picLocks noChangeAspect="1"/>
+          </p:cNvPicPr>
+          <p:nvPr/>
+        </p:nvPicPr>
+        <p:blipFill>
+          <a:blip r:embed="rId8">
+            <a:extLst>
+              <a:ext uri="{28A0092B-C50C-407E-A947-70E740481C1C}">
+                <a14:useLocalDpi xmlns:a14="http://schemas.microsoft.com/office/drawing/2010/main" val="0"/>
+              </a:ext>
+            </a:extLst>
+          </a:blip>
+          <a:stretch>
+            <a:fillRect/>
+          </a:stretch>
+        </p:blipFill>
+        <p:spPr>
+          <a:xfrm>
+            <a:off x="9185055" y="1455005"/>
+            <a:ext cx="648519" cy="825849"/>
+          </a:xfrm>
+          <a:prstGeom prst="rect">
+            <a:avLst/>
+          </a:prstGeom>
+          <a:ln w="19050">
+            <a:solidFill>
+              <a:schemeClr val="tx1"/>
+            </a:solidFill>
+          </a:ln>
+        </p:spPr>
+      </p:pic>
+      <p:pic>
+        <p:nvPicPr>
+          <p:cNvPr id="75" name="Picture 74" descr="A diagram of a solar power generator&#10;&#10;AI-generated content may be incorrect.">
+            <a:extLst>
+              <a:ext uri="{FF2B5EF4-FFF2-40B4-BE49-F238E27FC236}">
+                <a16:creationId xmlns:a16="http://schemas.microsoft.com/office/drawing/2014/main" id="{1C38E639-3996-275F-5D07-6D3ED38F05D6}"/>
+              </a:ext>
+            </a:extLst>
+          </p:cNvPr>
+          <p:cNvPicPr>
+            <a:picLocks noChangeAspect="1"/>
+          </p:cNvPicPr>
+          <p:nvPr/>
+        </p:nvPicPr>
+        <p:blipFill>
+          <a:blip r:embed="rId9">
+            <a:extLst>
+              <a:ext uri="{28A0092B-C50C-407E-A947-70E740481C1C}">
+                <a14:useLocalDpi xmlns:a14="http://schemas.microsoft.com/office/drawing/2010/main" val="0"/>
+              </a:ext>
+            </a:extLst>
+          </a:blip>
+          <a:srcRect r="24442"/>
+          <a:stretch>
+            <a:fillRect/>
+          </a:stretch>
+        </p:blipFill>
+        <p:spPr>
+          <a:xfrm>
+            <a:off x="10021496" y="1460018"/>
+            <a:ext cx="843283" cy="815821"/>
+          </a:xfrm>
+          <a:prstGeom prst="rect">
+            <a:avLst/>
+          </a:prstGeom>
+          <a:ln w="12700">
+            <a:solidFill>
+              <a:schemeClr val="tx1"/>
+            </a:solidFill>
+          </a:ln>
+        </p:spPr>
+      </p:pic>
+      <p:pic>
+        <p:nvPicPr>
+          <p:cNvPr id="77" name="Picture 76" descr="A screenshot of a computer&#10;&#10;AI-generated content may be incorrect.">
+            <a:extLst>
+              <a:ext uri="{FF2B5EF4-FFF2-40B4-BE49-F238E27FC236}">
+                <a16:creationId xmlns:a16="http://schemas.microsoft.com/office/drawing/2014/main" id="{C6940A32-913C-101F-A773-2FC52D884241}"/>
+              </a:ext>
+            </a:extLst>
+          </p:cNvPr>
+          <p:cNvPicPr>
+            <a:picLocks noChangeAspect="1"/>
+          </p:cNvPicPr>
+          <p:nvPr/>
+        </p:nvPicPr>
+        <p:blipFill>
+          <a:blip r:embed="rId10">
+            <a:extLst>
+              <a:ext uri="{28A0092B-C50C-407E-A947-70E740481C1C}">
+                <a14:useLocalDpi xmlns:a14="http://schemas.microsoft.com/office/drawing/2010/main" val="0"/>
+              </a:ext>
+            </a:extLst>
+          </a:blip>
+          <a:srcRect r="27815"/>
+          <a:stretch>
+            <a:fillRect/>
+          </a:stretch>
+        </p:blipFill>
+        <p:spPr>
+          <a:xfrm>
+            <a:off x="11045575" y="1455005"/>
+            <a:ext cx="732360" cy="807841"/>
+          </a:xfrm>
+          <a:prstGeom prst="rect">
+            <a:avLst/>
+          </a:prstGeom>
+          <a:ln w="12700">
+            <a:solidFill>
+              <a:schemeClr val="tx1"/>
+            </a:solidFill>
+          </a:ln>
+        </p:spPr>
+      </p:pic>
+      <p:sp>
+        <p:nvSpPr>
+          <p:cNvPr id="78" name="TextBox 77">
+            <a:extLst>
+              <a:ext uri="{FF2B5EF4-FFF2-40B4-BE49-F238E27FC236}">
+                <a16:creationId xmlns:a16="http://schemas.microsoft.com/office/drawing/2014/main" id="{005B7D8B-1A49-BCD8-B4A4-19007EA9FC1C}"/>
+              </a:ext>
+            </a:extLst>
+          </p:cNvPr>
+          <p:cNvSpPr txBox="1"/>
+          <p:nvPr/>
+        </p:nvSpPr>
+        <p:spPr>
+          <a:xfrm>
+            <a:off x="8002155" y="1170556"/>
+            <a:ext cx="927701" cy="276999"/>
+          </a:xfrm>
+          <a:prstGeom prst="rect">
+            <a:avLst/>
+          </a:prstGeom>
+          <a:noFill/>
+        </p:spPr>
+        <p:txBody>
+          <a:bodyPr wrap="square">
+            <a:spAutoFit/>
+          </a:bodyPr>
+          <a:lstStyle/>
+          <a:p>
+            <a:r>
+              <a:rPr lang="en-US" sz="1200" b="1" dirty="0"/>
+              <a:t>Charging</a:t>
+            </a:r>
+            <a:endParaRPr lang="en-SG" sz="1200" b="1" dirty="0"/>
+          </a:p>
+        </p:txBody>
+      </p:sp>
+      <p:sp>
+        <p:nvSpPr>
+          <p:cNvPr id="79" name="TextBox 78">
+            <a:extLst>
+              <a:ext uri="{FF2B5EF4-FFF2-40B4-BE49-F238E27FC236}">
+                <a16:creationId xmlns:a16="http://schemas.microsoft.com/office/drawing/2014/main" id="{791EE5EB-836D-E126-4BB6-A4EF795D678F}"/>
+              </a:ext>
+            </a:extLst>
+          </p:cNvPr>
+          <p:cNvSpPr txBox="1"/>
+          <p:nvPr/>
+        </p:nvSpPr>
+        <p:spPr>
+          <a:xfrm>
+            <a:off x="9949118" y="1135535"/>
+            <a:ext cx="1150533" cy="276999"/>
+          </a:xfrm>
+          <a:prstGeom prst="rect">
+            <a:avLst/>
+          </a:prstGeom>
+          <a:noFill/>
+        </p:spPr>
+        <p:txBody>
+          <a:bodyPr wrap="square">
+            <a:spAutoFit/>
+          </a:bodyPr>
+          <a:lstStyle/>
+          <a:p>
+            <a:r>
+              <a:rPr lang="en-US" sz="1200" b="1" dirty="0"/>
+              <a:t>Discharging</a:t>
+            </a:r>
+            <a:endParaRPr lang="en-SG" sz="1200" b="1" dirty="0"/>
+          </a:p>
+        </p:txBody>
+      </p:sp>
+      <p:sp>
+        <p:nvSpPr>
+          <p:cNvPr id="80" name="TextBox 79">
+            <a:extLst>
+              <a:ext uri="{FF2B5EF4-FFF2-40B4-BE49-F238E27FC236}">
+                <a16:creationId xmlns:a16="http://schemas.microsoft.com/office/drawing/2014/main" id="{48B8DA3D-E187-6793-0848-EA73D2811509}"/>
+              </a:ext>
+            </a:extLst>
+          </p:cNvPr>
+          <p:cNvSpPr txBox="1"/>
+          <p:nvPr/>
+        </p:nvSpPr>
+        <p:spPr>
+          <a:xfrm>
+            <a:off x="9086233" y="1160783"/>
+            <a:ext cx="648519" cy="276999"/>
+          </a:xfrm>
+          <a:prstGeom prst="rect">
+            <a:avLst/>
+          </a:prstGeom>
+          <a:noFill/>
+        </p:spPr>
+        <p:txBody>
+          <a:bodyPr wrap="square">
+            <a:spAutoFit/>
+          </a:bodyPr>
+          <a:lstStyle/>
+          <a:p>
+            <a:r>
+              <a:rPr lang="en-US" sz="1200" b="1" dirty="0"/>
+              <a:t>Idle</a:t>
+            </a:r>
+            <a:endParaRPr lang="en-SG" sz="1200" b="1" dirty="0"/>
+          </a:p>
+        </p:txBody>
+      </p:sp>
+      <p:sp>
+        <p:nvSpPr>
+          <p:cNvPr id="81" name="TextBox 80">
+            <a:extLst>
+              <a:ext uri="{FF2B5EF4-FFF2-40B4-BE49-F238E27FC236}">
+                <a16:creationId xmlns:a16="http://schemas.microsoft.com/office/drawing/2014/main" id="{BF8F0663-633A-3CD1-6D99-0325F28E7C49}"/>
+              </a:ext>
+            </a:extLst>
+          </p:cNvPr>
+          <p:cNvSpPr txBox="1"/>
+          <p:nvPr/>
+        </p:nvSpPr>
+        <p:spPr>
+          <a:xfrm>
+            <a:off x="10947906" y="1318597"/>
+            <a:ext cx="1244094" cy="276999"/>
+          </a:xfrm>
+          <a:prstGeom prst="rect">
+            <a:avLst/>
+          </a:prstGeom>
+          <a:noFill/>
+        </p:spPr>
+        <p:txBody>
+          <a:bodyPr wrap="square">
+            <a:spAutoFit/>
+          </a:bodyPr>
+          <a:lstStyle/>
+          <a:p>
+            <a:r>
+              <a:rPr lang="en-US" sz="1200" b="1" dirty="0"/>
+              <a:t>Disconnect </a:t>
+            </a:r>
+            <a:endParaRPr lang="en-SG" sz="1200" b="1" dirty="0"/>
+          </a:p>
+        </p:txBody>
+      </p:sp>
+      <p:sp>
+        <p:nvSpPr>
+          <p:cNvPr id="83" name="TextBox 82">
+            <a:extLst>
+              <a:ext uri="{FF2B5EF4-FFF2-40B4-BE49-F238E27FC236}">
+                <a16:creationId xmlns:a16="http://schemas.microsoft.com/office/drawing/2014/main" id="{D6003B9A-F5E8-3D36-21BA-4C3560595AD1}"/>
+              </a:ext>
+            </a:extLst>
+          </p:cNvPr>
+          <p:cNvSpPr txBox="1"/>
+          <p:nvPr/>
+        </p:nvSpPr>
+        <p:spPr>
+          <a:xfrm>
+            <a:off x="1524000" y="397073"/>
+            <a:ext cx="10306083" cy="400110"/>
+          </a:xfrm>
+          <a:prstGeom prst="rect">
+            <a:avLst/>
+          </a:prstGeom>
+          <a:noFill/>
+          <a:ln w="19050">
+            <a:solidFill>
+              <a:schemeClr val="tx1"/>
+            </a:solidFill>
+            <a:prstDash val="sysDash"/>
+          </a:ln>
+        </p:spPr>
+        <p:txBody>
+          <a:bodyPr wrap="square" rtlCol="0">
+            <a:spAutoFit/>
+          </a:bodyPr>
+          <a:lstStyle/>
+          <a:p>
+            <a:r>
+              <a:rPr lang="en-US" sz="2000" b="1" dirty="0"/>
+              <a:t>Implement Battery Based Energy Storage System (BESS) In Power Grid OT Cyber Range</a:t>
+            </a:r>
+            <a:endParaRPr lang="en-SG" sz="2000" b="1" dirty="0"/>
+          </a:p>
+        </p:txBody>
+      </p:sp>
+      <p:sp>
+        <p:nvSpPr>
+          <p:cNvPr id="84" name="Rectangle 83">
+            <a:extLst>
+              <a:ext uri="{FF2B5EF4-FFF2-40B4-BE49-F238E27FC236}">
+                <a16:creationId xmlns:a16="http://schemas.microsoft.com/office/drawing/2014/main" id="{2134B61F-AC6A-FF71-666A-3812B10BEA8A}"/>
+              </a:ext>
+            </a:extLst>
+          </p:cNvPr>
+          <p:cNvSpPr/>
+          <p:nvPr/>
+        </p:nvSpPr>
+        <p:spPr>
+          <a:xfrm>
+            <a:off x="422354" y="6236949"/>
+            <a:ext cx="3322043" cy="334705"/>
+          </a:xfrm>
+          <a:prstGeom prst="rect">
+            <a:avLst/>
+          </a:prstGeom>
+          <a:solidFill>
+            <a:schemeClr val="accent6">
+              <a:lumMod val="40000"/>
+              <a:lumOff val="60000"/>
+            </a:schemeClr>
+          </a:solidFill>
+        </p:spPr>
+        <p:style>
+          <a:lnRef idx="2">
+            <a:schemeClr val="accent1">
+              <a:shade val="15000"/>
+            </a:schemeClr>
+          </a:lnRef>
+          <a:fillRef idx="1">
+            <a:schemeClr val="accent1"/>
+          </a:fillRef>
+          <a:effectRef idx="0">
+            <a:schemeClr val="accent1"/>
+          </a:effectRef>
+          <a:fontRef idx="minor">
+            <a:schemeClr val="lt1"/>
+          </a:fontRef>
+        </p:style>
+        <p:txBody>
+          <a:bodyPr rtlCol="0" anchor="ctr"/>
+          <a:lstStyle/>
+          <a:p>
+            <a:pPr algn="ctr"/>
+            <a:r>
+              <a:rPr lang="en-US" sz="1050" b="1" dirty="0">
+                <a:solidFill>
+                  <a:schemeClr val="tx1"/>
+                </a:solidFill>
+              </a:rPr>
+              <a:t>Level 0 OT Physical Process Field I/O  Device Layer</a:t>
+            </a:r>
+            <a:endParaRPr lang="en-SG" sz="1050" b="1" dirty="0">
+              <a:solidFill>
+                <a:schemeClr val="tx1"/>
+              </a:solidFill>
+            </a:endParaRPr>
+          </a:p>
+        </p:txBody>
+      </p:sp>
+      <p:sp>
+        <p:nvSpPr>
+          <p:cNvPr id="85" name="Rectangle 84">
+            <a:extLst>
+              <a:ext uri="{FF2B5EF4-FFF2-40B4-BE49-F238E27FC236}">
+                <a16:creationId xmlns:a16="http://schemas.microsoft.com/office/drawing/2014/main" id="{71F5B6C2-B4A2-4FF9-E23E-7E4F8AAD8A9F}"/>
+              </a:ext>
+            </a:extLst>
+          </p:cNvPr>
+          <p:cNvSpPr/>
+          <p:nvPr/>
+        </p:nvSpPr>
+        <p:spPr>
+          <a:xfrm>
+            <a:off x="3870035" y="6228512"/>
+            <a:ext cx="3149601" cy="334705"/>
+          </a:xfrm>
+          <a:prstGeom prst="rect">
+            <a:avLst/>
+          </a:prstGeom>
+          <a:solidFill>
+            <a:schemeClr val="accent2">
+              <a:lumMod val="20000"/>
+              <a:lumOff val="80000"/>
+            </a:schemeClr>
+          </a:solidFill>
+        </p:spPr>
+        <p:style>
+          <a:lnRef idx="2">
+            <a:schemeClr val="accent1">
+              <a:shade val="15000"/>
+            </a:schemeClr>
+          </a:lnRef>
+          <a:fillRef idx="1">
+            <a:schemeClr val="accent1"/>
+          </a:fillRef>
+          <a:effectRef idx="0">
+            <a:schemeClr val="accent1"/>
+          </a:effectRef>
+          <a:fontRef idx="minor">
+            <a:schemeClr val="lt1"/>
+          </a:fontRef>
+        </p:style>
+        <p:txBody>
+          <a:bodyPr rtlCol="0" anchor="ctr"/>
+          <a:lstStyle/>
+          <a:p>
+            <a:pPr algn="ctr"/>
+            <a:r>
+              <a:rPr lang="en-SG" sz="1100" b="1" dirty="0">
+                <a:solidFill>
+                  <a:schemeClr val="tx1"/>
+                </a:solidFill>
+              </a:rPr>
+              <a:t>Level 1 OT System Controller LAN Layer</a:t>
+            </a:r>
+          </a:p>
+        </p:txBody>
+      </p:sp>
+      <p:sp>
+        <p:nvSpPr>
+          <p:cNvPr id="86" name="Rectangle 85">
+            <a:extLst>
+              <a:ext uri="{FF2B5EF4-FFF2-40B4-BE49-F238E27FC236}">
+                <a16:creationId xmlns:a16="http://schemas.microsoft.com/office/drawing/2014/main" id="{7A404225-1558-CD1B-44BA-98129861B2F7}"/>
+              </a:ext>
+            </a:extLst>
+          </p:cNvPr>
+          <p:cNvSpPr/>
+          <p:nvPr/>
+        </p:nvSpPr>
+        <p:spPr>
+          <a:xfrm>
+            <a:off x="7148945" y="6224373"/>
+            <a:ext cx="4628990" cy="334705"/>
+          </a:xfrm>
+          <a:prstGeom prst="rect">
+            <a:avLst/>
+          </a:prstGeom>
+          <a:solidFill>
+            <a:schemeClr val="accent1">
+              <a:lumMod val="20000"/>
+              <a:lumOff val="80000"/>
+            </a:schemeClr>
+          </a:solidFill>
+        </p:spPr>
+        <p:style>
+          <a:lnRef idx="2">
+            <a:schemeClr val="accent1">
+              <a:shade val="15000"/>
+            </a:schemeClr>
+          </a:lnRef>
+          <a:fillRef idx="1">
+            <a:schemeClr val="accent1"/>
+          </a:fillRef>
+          <a:effectRef idx="0">
+            <a:schemeClr val="accent1"/>
+          </a:effectRef>
+          <a:fontRef idx="minor">
+            <a:schemeClr val="lt1"/>
+          </a:fontRef>
+        </p:style>
+        <p:txBody>
+          <a:bodyPr rtlCol="0" anchor="ctr"/>
+          <a:lstStyle/>
+          <a:p>
+            <a:pPr algn="ctr"/>
+            <a:r>
+              <a:rPr lang="en-US" sz="1100" b="1" dirty="0">
+                <a:solidFill>
+                  <a:schemeClr val="tx1"/>
+                </a:solidFill>
+              </a:rPr>
+              <a:t>Level 2 Power Grid Control Center Processing LAN Layer</a:t>
+            </a:r>
+            <a:endParaRPr lang="en-SG" sz="1100" b="1" dirty="0">
+              <a:solidFill>
+                <a:schemeClr val="tx1"/>
+              </a:solidFill>
+            </a:endParaRPr>
+          </a:p>
+        </p:txBody>
+      </p:sp>
+      <p:pic>
+        <p:nvPicPr>
+          <p:cNvPr id="88" name="Picture 87" descr="A logo for a power grid simulation system&#10;&#10;AI-generated content may be incorrect.">
+            <a:extLst>
+              <a:ext uri="{FF2B5EF4-FFF2-40B4-BE49-F238E27FC236}">
+                <a16:creationId xmlns:a16="http://schemas.microsoft.com/office/drawing/2014/main" id="{FE8471DE-2E52-1595-FF16-269C581DC97E}"/>
+              </a:ext>
+            </a:extLst>
+          </p:cNvPr>
+          <p:cNvPicPr>
+            <a:picLocks noChangeAspect="1"/>
+          </p:cNvPicPr>
+          <p:nvPr/>
+        </p:nvPicPr>
+        <p:blipFill>
+          <a:blip r:embed="rId11">
+            <a:extLst>
+              <a:ext uri="{28A0092B-C50C-407E-A947-70E740481C1C}">
+                <a14:useLocalDpi xmlns:a14="http://schemas.microsoft.com/office/drawing/2010/main" val="0"/>
+              </a:ext>
+            </a:extLst>
+          </a:blip>
+          <a:stretch>
+            <a:fillRect/>
+          </a:stretch>
+        </p:blipFill>
+        <p:spPr>
+          <a:xfrm>
+            <a:off x="351245" y="323723"/>
+            <a:ext cx="1058669" cy="1148656"/>
+          </a:xfrm>
+          <a:prstGeom prst="rect">
+            <a:avLst/>
+          </a:prstGeom>
+        </p:spPr>
+      </p:pic>
     </p:spTree>
     <p:extLst>
       <p:ext uri="{BB962C8B-B14F-4D97-AF65-F5344CB8AC3E}">

</xml_diff>